<commit_message>
Design changes with Angeliki
</commit_message>
<xml_diff>
--- a/Docs/v1.0/WAG mock ui.pptx
+++ b/Docs/v1.0/WAG mock ui.pptx
@@ -21,7 +21,7 @@
     <p:sldId id="282" r:id="rId12"/>
     <p:sldId id="275" r:id="rId13"/>
     <p:sldId id="283" r:id="rId14"/>
-    <p:sldId id="285" r:id="rId15"/>
+    <p:sldId id="290" r:id="rId15"/>
     <p:sldId id="286" r:id="rId16"/>
     <p:sldId id="287" r:id="rId17"/>
     <p:sldId id="288" r:id="rId18"/>
@@ -209,7 +209,7 @@
           <a:p>
             <a:fld id="{B861E20A-27E1-4770-9216-DBEF67997CAD}" type="datetimeFigureOut">
               <a:rPr lang="en-CA" smtClean="0"/>
-              <a:t>13/11/2013</a:t>
+              <a:t>15/11/2013</a:t>
             </a:fld>
             <a:endParaRPr lang="en-CA"/>
           </a:p>
@@ -1078,7 +1078,7 @@
           <a:p>
             <a:fld id="{F0DAF099-954F-4ED4-86A3-0AD7F13127F0}" type="datetimeFigureOut">
               <a:rPr lang="en-CA" smtClean="0"/>
-              <a:t>13/11/2013</a:t>
+              <a:t>15/11/2013</a:t>
             </a:fld>
             <a:endParaRPr lang="en-CA"/>
           </a:p>
@@ -1248,7 +1248,7 @@
           <a:p>
             <a:fld id="{F0DAF099-954F-4ED4-86A3-0AD7F13127F0}" type="datetimeFigureOut">
               <a:rPr lang="en-CA" smtClean="0"/>
-              <a:t>13/11/2013</a:t>
+              <a:t>15/11/2013</a:t>
             </a:fld>
             <a:endParaRPr lang="en-CA"/>
           </a:p>
@@ -1428,7 +1428,7 @@
           <a:p>
             <a:fld id="{F0DAF099-954F-4ED4-86A3-0AD7F13127F0}" type="datetimeFigureOut">
               <a:rPr lang="en-CA" smtClean="0"/>
-              <a:t>13/11/2013</a:t>
+              <a:t>15/11/2013</a:t>
             </a:fld>
             <a:endParaRPr lang="en-CA"/>
           </a:p>
@@ -1598,7 +1598,7 @@
           <a:p>
             <a:fld id="{F0DAF099-954F-4ED4-86A3-0AD7F13127F0}" type="datetimeFigureOut">
               <a:rPr lang="en-CA" smtClean="0"/>
-              <a:t>13/11/2013</a:t>
+              <a:t>15/11/2013</a:t>
             </a:fld>
             <a:endParaRPr lang="en-CA"/>
           </a:p>
@@ -1844,7 +1844,7 @@
           <a:p>
             <a:fld id="{F0DAF099-954F-4ED4-86A3-0AD7F13127F0}" type="datetimeFigureOut">
               <a:rPr lang="en-CA" smtClean="0"/>
-              <a:t>13/11/2013</a:t>
+              <a:t>15/11/2013</a:t>
             </a:fld>
             <a:endParaRPr lang="en-CA"/>
           </a:p>
@@ -2132,7 +2132,7 @@
           <a:p>
             <a:fld id="{F0DAF099-954F-4ED4-86A3-0AD7F13127F0}" type="datetimeFigureOut">
               <a:rPr lang="en-CA" smtClean="0"/>
-              <a:t>13/11/2013</a:t>
+              <a:t>15/11/2013</a:t>
             </a:fld>
             <a:endParaRPr lang="en-CA"/>
           </a:p>
@@ -2554,7 +2554,7 @@
           <a:p>
             <a:fld id="{F0DAF099-954F-4ED4-86A3-0AD7F13127F0}" type="datetimeFigureOut">
               <a:rPr lang="en-CA" smtClean="0"/>
-              <a:t>13/11/2013</a:t>
+              <a:t>15/11/2013</a:t>
             </a:fld>
             <a:endParaRPr lang="en-CA"/>
           </a:p>
@@ -2672,7 +2672,7 @@
           <a:p>
             <a:fld id="{F0DAF099-954F-4ED4-86A3-0AD7F13127F0}" type="datetimeFigureOut">
               <a:rPr lang="en-CA" smtClean="0"/>
-              <a:t>13/11/2013</a:t>
+              <a:t>15/11/2013</a:t>
             </a:fld>
             <a:endParaRPr lang="en-CA"/>
           </a:p>
@@ -2767,7 +2767,7 @@
           <a:p>
             <a:fld id="{F0DAF099-954F-4ED4-86A3-0AD7F13127F0}" type="datetimeFigureOut">
               <a:rPr lang="en-CA" smtClean="0"/>
-              <a:t>13/11/2013</a:t>
+              <a:t>15/11/2013</a:t>
             </a:fld>
             <a:endParaRPr lang="en-CA"/>
           </a:p>
@@ -3044,7 +3044,7 @@
           <a:p>
             <a:fld id="{F0DAF099-954F-4ED4-86A3-0AD7F13127F0}" type="datetimeFigureOut">
               <a:rPr lang="en-CA" smtClean="0"/>
-              <a:t>13/11/2013</a:t>
+              <a:t>15/11/2013</a:t>
             </a:fld>
             <a:endParaRPr lang="en-CA"/>
           </a:p>
@@ -3297,7 +3297,7 @@
           <a:p>
             <a:fld id="{F0DAF099-954F-4ED4-86A3-0AD7F13127F0}" type="datetimeFigureOut">
               <a:rPr lang="en-CA" smtClean="0"/>
-              <a:t>13/11/2013</a:t>
+              <a:t>15/11/2013</a:t>
             </a:fld>
             <a:endParaRPr lang="en-CA"/>
           </a:p>
@@ -3510,7 +3510,7 @@
           <a:p>
             <a:fld id="{F0DAF099-954F-4ED4-86A3-0AD7F13127F0}" type="datetimeFigureOut">
               <a:rPr lang="en-CA" smtClean="0"/>
-              <a:t>13/11/2013</a:t>
+              <a:t>15/11/2013</a:t>
             </a:fld>
             <a:endParaRPr lang="en-CA"/>
           </a:p>
@@ -6819,10 +6819,10 @@
         </p:nvGrpSpPr>
         <p:grpSpPr>
           <a:xfrm>
-            <a:off x="141981" y="132700"/>
-            <a:ext cx="3408314" cy="4874198"/>
-            <a:chOff x="155574" y="-419078"/>
-            <a:chExt cx="3408314" cy="4874198"/>
+            <a:off x="141981" y="134153"/>
+            <a:ext cx="3408314" cy="4872745"/>
+            <a:chOff x="155574" y="-417625"/>
+            <a:chExt cx="3408314" cy="4872745"/>
           </a:xfrm>
         </p:grpSpPr>
         <p:sp>
@@ -6882,59 +6882,13 @@
         </p:sp>
         <p:sp>
           <p:nvSpPr>
-            <p:cNvPr id="27" name="Rectangle 26"/>
-            <p:cNvSpPr/>
-            <p:nvPr/>
-          </p:nvSpPr>
-          <p:spPr>
-            <a:xfrm>
-              <a:off x="1739893" y="-419078"/>
-              <a:ext cx="1724383" cy="523220"/>
-            </a:xfrm>
-            <a:prstGeom prst="rect">
-              <a:avLst/>
-            </a:prstGeom>
-          </p:spPr>
-          <p:txBody>
-            <a:bodyPr wrap="none">
-              <a:spAutoFit/>
-            </a:bodyPr>
-            <a:lstStyle/>
-            <a:p>
-              <a:r>
-                <a:rPr lang="en-CA" sz="1400" b="1" dirty="0" err="1" smtClean="0"/>
-                <a:t>Toonoo</a:t>
-              </a:r>
-              <a:r>
-                <a:rPr lang="en-CA" sz="1400" b="1" dirty="0" smtClean="0"/>
-                <a:t> </a:t>
-              </a:r>
-              <a:r>
-                <a:rPr lang="en-CA" sz="1400" b="1" dirty="0" err="1" smtClean="0"/>
-                <a:t>Sharky</a:t>
-              </a:r>
-              <a:r>
-                <a:rPr lang="en-CA" sz="1400" b="1" dirty="0" smtClean="0"/>
-                <a:t>, 1970</a:t>
-              </a:r>
-            </a:p>
-            <a:p>
-              <a:r>
-                <a:rPr lang="en-CA" sz="1400" b="1" dirty="0" smtClean="0"/>
-                <a:t>Cape Dorset, CA</a:t>
-              </a:r>
-            </a:p>
-          </p:txBody>
-        </p:sp>
-        <p:sp>
-          <p:nvSpPr>
             <p:cNvPr id="30" name="Rectangle 29"/>
             <p:cNvSpPr/>
             <p:nvPr/>
           </p:nvSpPr>
           <p:spPr>
             <a:xfrm>
-              <a:off x="1843414" y="11377"/>
+              <a:off x="1843414" y="-384463"/>
               <a:ext cx="1646262" cy="1578894"/>
             </a:xfrm>
             <a:prstGeom prst="rect">
@@ -7560,13 +7514,13 @@
   <p:clrMapOvr>
     <a:masterClrMapping/>
   </p:clrMapOvr>
-  <mc:AlternateContent xmlns:mc="http://schemas.openxmlformats.org/markup-compatibility/2006">
-    <mc:Choice xmlns:p14="http://schemas.microsoft.com/office/powerpoint/2010/main" Requires="p14">
+  <mc:AlternateContent xmlns:mc="http://schemas.openxmlformats.org/markup-compatibility/2006" xmlns:p14="http://schemas.microsoft.com/office/powerpoint/2010/main">
+    <mc:Choice Requires="p14">
       <p:transition spd="med" p14:dur="700">
         <p:fade/>
       </p:transition>
     </mc:Choice>
-    <mc:Fallback>
+    <mc:Fallback xmlns="">
       <p:transition spd="med">
         <p:fade/>
       </p:transition>
@@ -11753,17 +11707,12 @@
               </a:rPr>
               <a:t>Steatite</a:t>
             </a:r>
-            <a:endParaRPr lang="en-CA" sz="800" dirty="0">
-              <a:solidFill>
-                <a:schemeClr val="bg1"/>
-              </a:solidFill>
-            </a:endParaRPr>
           </a:p>
         </p:txBody>
       </p:sp>
       <p:pic>
         <p:nvPicPr>
-          <p:cNvPr id="6148" name="Picture 4" descr="http://www.inuit.com/sites/inuit/gallery/pictures/1369090170374.jpg"/>
+          <p:cNvPr id="6150" name="Picture 6" descr="http://www.inuit.com/sites/inuit/gallery/pictures/1361316745573.jpg"/>
           <p:cNvPicPr>
             <a:picLocks noChangeAspect="1" noChangeArrowheads="1"/>
           </p:cNvPicPr>
@@ -11784,8 +11733,8 @@
         </p:blipFill>
         <p:spPr bwMode="auto">
           <a:xfrm>
-            <a:off x="2477737" y="1756034"/>
-            <a:ext cx="581760" cy="371356"/>
+            <a:off x="2456903" y="1744014"/>
+            <a:ext cx="601362" cy="395395"/>
           </a:xfrm>
           <a:prstGeom prst="rect">
             <a:avLst/>
@@ -11802,298 +11751,9 @@
           </a:extLst>
         </p:spPr>
       </p:pic>
-      <p:sp>
-        <p:nvSpPr>
-          <p:cNvPr id="75" name="Rounded Rectangle 74"/>
-          <p:cNvSpPr/>
-          <p:nvPr/>
-        </p:nvSpPr>
-        <p:spPr>
-          <a:xfrm>
-            <a:off x="2430258" y="2307169"/>
-            <a:ext cx="675629" cy="123112"/>
-          </a:xfrm>
-          <a:prstGeom prst="roundRect">
-            <a:avLst/>
-          </a:prstGeom>
-          <a:solidFill>
-            <a:schemeClr val="tx1">
-              <a:lumMod val="75000"/>
-              <a:lumOff val="25000"/>
-            </a:schemeClr>
-          </a:solidFill>
-          <a:ln w="6350">
-            <a:solidFill>
-              <a:schemeClr val="bg1"/>
-            </a:solidFill>
-          </a:ln>
-        </p:spPr>
-        <p:style>
-          <a:lnRef idx="2">
-            <a:schemeClr val="accent2"/>
-          </a:lnRef>
-          <a:fillRef idx="1">
-            <a:schemeClr val="lt1"/>
-          </a:fillRef>
-          <a:effectRef idx="0">
-            <a:schemeClr val="accent2"/>
-          </a:effectRef>
-          <a:fontRef idx="minor">
-            <a:schemeClr val="dk1"/>
-          </a:fontRef>
-        </p:style>
-        <p:txBody>
-          <a:bodyPr rot="0" spcFirstLastPara="0" vertOverflow="overflow" horzOverflow="overflow" vert="horz" wrap="square" lIns="91440" tIns="45720" rIns="91440" bIns="45720" numCol="1" spcCol="0" rtlCol="0" fromWordArt="0" anchor="ctr" anchorCtr="0" forceAA="0" compatLnSpc="1">
-            <a:prstTxWarp prst="textNoShape">
-              <a:avLst/>
-            </a:prstTxWarp>
-            <a:noAutofit/>
-          </a:bodyPr>
-          <a:lstStyle/>
-          <a:p>
-            <a:pPr algn="ctr"/>
-            <a:endParaRPr lang="en-CA"/>
-          </a:p>
-        </p:txBody>
-      </p:sp>
-      <p:sp>
-        <p:nvSpPr>
-          <p:cNvPr id="76" name="Rectangle 75"/>
-          <p:cNvSpPr/>
-          <p:nvPr/>
-        </p:nvSpPr>
-        <p:spPr>
-          <a:xfrm>
-            <a:off x="2465096" y="2307170"/>
-            <a:ext cx="501740" cy="123111"/>
-          </a:xfrm>
-          <a:prstGeom prst="rect">
-            <a:avLst/>
-          </a:prstGeom>
-        </p:spPr>
-        <p:txBody>
-          <a:bodyPr wrap="none" lIns="0" tIns="0" rIns="0" bIns="0">
-            <a:spAutoFit/>
-          </a:bodyPr>
-          <a:lstStyle/>
-          <a:p>
-            <a:r>
-              <a:rPr lang="en-CA" sz="800" dirty="0" err="1">
-                <a:solidFill>
-                  <a:schemeClr val="bg1"/>
-                </a:solidFill>
-              </a:rPr>
-              <a:t>Barnabus</a:t>
-            </a:r>
-            <a:r>
-              <a:rPr lang="en-CA" sz="800" dirty="0">
-                <a:solidFill>
-                  <a:schemeClr val="bg1"/>
-                </a:solidFill>
-              </a:rPr>
-              <a:t> </a:t>
-            </a:r>
-            <a:r>
-              <a:rPr lang="en-CA" sz="800" dirty="0" smtClean="0">
-                <a:solidFill>
-                  <a:schemeClr val="bg1"/>
-                </a:solidFill>
-              </a:rPr>
-              <a:t>A.</a:t>
-            </a:r>
-            <a:endParaRPr lang="en-CA" sz="800" dirty="0">
-              <a:solidFill>
-                <a:schemeClr val="bg1"/>
-              </a:solidFill>
-            </a:endParaRPr>
-          </a:p>
-        </p:txBody>
-      </p:sp>
-      <p:sp>
-        <p:nvSpPr>
-          <p:cNvPr id="77" name="Rounded Rectangle 76"/>
-          <p:cNvSpPr/>
-          <p:nvPr/>
-        </p:nvSpPr>
-        <p:spPr>
-          <a:xfrm>
-            <a:off x="2430259" y="2459569"/>
-            <a:ext cx="254576" cy="123112"/>
-          </a:xfrm>
-          <a:prstGeom prst="roundRect">
-            <a:avLst/>
-          </a:prstGeom>
-          <a:solidFill>
-            <a:schemeClr val="tx1">
-              <a:lumMod val="75000"/>
-              <a:lumOff val="25000"/>
-            </a:schemeClr>
-          </a:solidFill>
-          <a:ln w="6350">
-            <a:solidFill>
-              <a:schemeClr val="bg1"/>
-            </a:solidFill>
-          </a:ln>
-        </p:spPr>
-        <p:style>
-          <a:lnRef idx="2">
-            <a:schemeClr val="accent2"/>
-          </a:lnRef>
-          <a:fillRef idx="1">
-            <a:schemeClr val="lt1"/>
-          </a:fillRef>
-          <a:effectRef idx="0">
-            <a:schemeClr val="accent2"/>
-          </a:effectRef>
-          <a:fontRef idx="minor">
-            <a:schemeClr val="dk1"/>
-          </a:fontRef>
-        </p:style>
-        <p:txBody>
-          <a:bodyPr rot="0" spcFirstLastPara="0" vertOverflow="overflow" horzOverflow="overflow" vert="horz" wrap="square" lIns="91440" tIns="45720" rIns="91440" bIns="45720" numCol="1" spcCol="0" rtlCol="0" fromWordArt="0" anchor="ctr" anchorCtr="0" forceAA="0" compatLnSpc="1">
-            <a:prstTxWarp prst="textNoShape">
-              <a:avLst/>
-            </a:prstTxWarp>
-            <a:noAutofit/>
-          </a:bodyPr>
-          <a:lstStyle/>
-          <a:p>
-            <a:pPr algn="ctr"/>
-            <a:endParaRPr lang="en-CA"/>
-          </a:p>
-        </p:txBody>
-      </p:sp>
-      <p:sp>
-        <p:nvSpPr>
-          <p:cNvPr id="78" name="Rectangle 77"/>
-          <p:cNvSpPr/>
-          <p:nvPr/>
-        </p:nvSpPr>
-        <p:spPr>
-          <a:xfrm>
-            <a:off x="2465096" y="2459569"/>
-            <a:ext cx="112210" cy="123111"/>
-          </a:xfrm>
-          <a:prstGeom prst="rect">
-            <a:avLst/>
-          </a:prstGeom>
-        </p:spPr>
-        <p:txBody>
-          <a:bodyPr wrap="none" lIns="0" tIns="0" rIns="0" bIns="0">
-            <a:spAutoFit/>
-          </a:bodyPr>
-          <a:lstStyle/>
-          <a:p>
-            <a:r>
-              <a:rPr lang="en-CA" sz="800" dirty="0" smtClean="0">
-                <a:solidFill>
-                  <a:schemeClr val="bg1"/>
-                </a:solidFill>
-              </a:rPr>
-              <a:t>Ox</a:t>
-            </a:r>
-            <a:endParaRPr lang="en-CA" sz="800" dirty="0">
-              <a:solidFill>
-                <a:schemeClr val="bg1"/>
-              </a:solidFill>
-            </a:endParaRPr>
-          </a:p>
-        </p:txBody>
-      </p:sp>
-      <p:sp>
-        <p:nvSpPr>
-          <p:cNvPr id="79" name="Rounded Rectangle 78"/>
-          <p:cNvSpPr/>
-          <p:nvPr/>
-        </p:nvSpPr>
-        <p:spPr>
-          <a:xfrm>
-            <a:off x="2719831" y="2459569"/>
-            <a:ext cx="392584" cy="123112"/>
-          </a:xfrm>
-          <a:prstGeom prst="roundRect">
-            <a:avLst/>
-          </a:prstGeom>
-          <a:solidFill>
-            <a:schemeClr val="tx1">
-              <a:lumMod val="75000"/>
-              <a:lumOff val="25000"/>
-            </a:schemeClr>
-          </a:solidFill>
-          <a:ln w="6350">
-            <a:solidFill>
-              <a:schemeClr val="bg1"/>
-            </a:solidFill>
-          </a:ln>
-        </p:spPr>
-        <p:style>
-          <a:lnRef idx="2">
-            <a:schemeClr val="accent2"/>
-          </a:lnRef>
-          <a:fillRef idx="1">
-            <a:schemeClr val="lt1"/>
-          </a:fillRef>
-          <a:effectRef idx="0">
-            <a:schemeClr val="accent2"/>
-          </a:effectRef>
-          <a:fontRef idx="minor">
-            <a:schemeClr val="dk1"/>
-          </a:fontRef>
-        </p:style>
-        <p:txBody>
-          <a:bodyPr rot="0" spcFirstLastPara="0" vertOverflow="overflow" horzOverflow="overflow" vert="horz" wrap="square" lIns="91440" tIns="45720" rIns="91440" bIns="45720" numCol="1" spcCol="0" rtlCol="0" fromWordArt="0" anchor="ctr" anchorCtr="0" forceAA="0" compatLnSpc="1">
-            <a:prstTxWarp prst="textNoShape">
-              <a:avLst/>
-            </a:prstTxWarp>
-            <a:noAutofit/>
-          </a:bodyPr>
-          <a:lstStyle/>
-          <a:p>
-            <a:pPr algn="ctr"/>
-            <a:endParaRPr lang="en-CA"/>
-          </a:p>
-        </p:txBody>
-      </p:sp>
-      <p:sp>
-        <p:nvSpPr>
-          <p:cNvPr id="80" name="Rectangle 79"/>
-          <p:cNvSpPr/>
-          <p:nvPr/>
-        </p:nvSpPr>
-        <p:spPr>
-          <a:xfrm>
-            <a:off x="2795898" y="2459569"/>
-            <a:ext cx="240450" cy="123111"/>
-          </a:xfrm>
-          <a:prstGeom prst="rect">
-            <a:avLst/>
-          </a:prstGeom>
-        </p:spPr>
-        <p:txBody>
-          <a:bodyPr wrap="none" lIns="0" tIns="0" rIns="0" bIns="0">
-            <a:spAutoFit/>
-          </a:bodyPr>
-          <a:lstStyle/>
-          <a:p>
-            <a:r>
-              <a:rPr lang="en-CA" sz="800" dirty="0" smtClean="0">
-                <a:solidFill>
-                  <a:schemeClr val="bg1"/>
-                </a:solidFill>
-              </a:rPr>
-              <a:t>Stone</a:t>
-            </a:r>
-            <a:endParaRPr lang="en-CA" sz="800" dirty="0">
-              <a:solidFill>
-                <a:schemeClr val="bg1"/>
-              </a:solidFill>
-            </a:endParaRPr>
-          </a:p>
-        </p:txBody>
-      </p:sp>
       <p:pic>
         <p:nvPicPr>
-          <p:cNvPr id="6150" name="Picture 6" descr="http://www.inuit.com/sites/inuit/gallery/pictures/1361316745573.jpg"/>
+          <p:cNvPr id="6148" name="Picture 4" descr="http://www.inuit.com/sites/inuit/gallery/pictures/1369090170374.jpg"/>
           <p:cNvPicPr>
             <a:picLocks noChangeAspect="1" noChangeArrowheads="1"/>
           </p:cNvPicPr>
@@ -12114,8 +11774,8 @@
         </p:blipFill>
         <p:spPr bwMode="auto">
           <a:xfrm>
-            <a:off x="290984" y="4062894"/>
-            <a:ext cx="601362" cy="395395"/>
+            <a:off x="298516" y="4031744"/>
+            <a:ext cx="581760" cy="371356"/>
           </a:xfrm>
           <a:prstGeom prst="rect">
             <a:avLst/>
@@ -12132,6 +11792,295 @@
           </a:extLst>
         </p:spPr>
       </p:pic>
+      <p:sp>
+        <p:nvSpPr>
+          <p:cNvPr id="75" name="Rounded Rectangle 74"/>
+          <p:cNvSpPr/>
+          <p:nvPr/>
+        </p:nvSpPr>
+        <p:spPr>
+          <a:xfrm>
+            <a:off x="2430258" y="2307169"/>
+            <a:ext cx="675629" cy="123112"/>
+          </a:xfrm>
+          <a:prstGeom prst="roundRect">
+            <a:avLst/>
+          </a:prstGeom>
+          <a:solidFill>
+            <a:schemeClr val="tx1">
+              <a:lumMod val="75000"/>
+              <a:lumOff val="25000"/>
+            </a:schemeClr>
+          </a:solidFill>
+          <a:ln w="6350">
+            <a:solidFill>
+              <a:schemeClr val="bg1"/>
+            </a:solidFill>
+          </a:ln>
+        </p:spPr>
+        <p:style>
+          <a:lnRef idx="2">
+            <a:schemeClr val="accent2"/>
+          </a:lnRef>
+          <a:fillRef idx="1">
+            <a:schemeClr val="lt1"/>
+          </a:fillRef>
+          <a:effectRef idx="0">
+            <a:schemeClr val="accent2"/>
+          </a:effectRef>
+          <a:fontRef idx="minor">
+            <a:schemeClr val="dk1"/>
+          </a:fontRef>
+        </p:style>
+        <p:txBody>
+          <a:bodyPr rot="0" spcFirstLastPara="0" vertOverflow="overflow" horzOverflow="overflow" vert="horz" wrap="square" lIns="91440" tIns="45720" rIns="91440" bIns="45720" numCol="1" spcCol="0" rtlCol="0" fromWordArt="0" anchor="ctr" anchorCtr="0" forceAA="0" compatLnSpc="1">
+            <a:prstTxWarp prst="textNoShape">
+              <a:avLst/>
+            </a:prstTxWarp>
+            <a:noAutofit/>
+          </a:bodyPr>
+          <a:lstStyle/>
+          <a:p>
+            <a:pPr algn="ctr"/>
+            <a:endParaRPr lang="en-CA"/>
+          </a:p>
+        </p:txBody>
+      </p:sp>
+      <p:sp>
+        <p:nvSpPr>
+          <p:cNvPr id="76" name="Rectangle 75"/>
+          <p:cNvSpPr/>
+          <p:nvPr/>
+        </p:nvSpPr>
+        <p:spPr>
+          <a:xfrm>
+            <a:off x="2465096" y="2307170"/>
+            <a:ext cx="501740" cy="123111"/>
+          </a:xfrm>
+          <a:prstGeom prst="rect">
+            <a:avLst/>
+          </a:prstGeom>
+        </p:spPr>
+        <p:txBody>
+          <a:bodyPr wrap="none" lIns="0" tIns="0" rIns="0" bIns="0">
+            <a:spAutoFit/>
+          </a:bodyPr>
+          <a:lstStyle/>
+          <a:p>
+            <a:r>
+              <a:rPr lang="en-CA" sz="800" dirty="0" err="1">
+                <a:solidFill>
+                  <a:schemeClr val="bg1"/>
+                </a:solidFill>
+              </a:rPr>
+              <a:t>Barnabus</a:t>
+            </a:r>
+            <a:r>
+              <a:rPr lang="en-CA" sz="800" dirty="0">
+                <a:solidFill>
+                  <a:schemeClr val="bg1"/>
+                </a:solidFill>
+              </a:rPr>
+              <a:t> </a:t>
+            </a:r>
+            <a:r>
+              <a:rPr lang="en-CA" sz="800" dirty="0" smtClean="0">
+                <a:solidFill>
+                  <a:schemeClr val="bg1"/>
+                </a:solidFill>
+              </a:rPr>
+              <a:t>A.</a:t>
+            </a:r>
+            <a:endParaRPr lang="en-CA" sz="800" dirty="0">
+              <a:solidFill>
+                <a:schemeClr val="bg1"/>
+              </a:solidFill>
+            </a:endParaRPr>
+          </a:p>
+        </p:txBody>
+      </p:sp>
+      <p:sp>
+        <p:nvSpPr>
+          <p:cNvPr id="77" name="Rounded Rectangle 76"/>
+          <p:cNvSpPr/>
+          <p:nvPr/>
+        </p:nvSpPr>
+        <p:spPr>
+          <a:xfrm>
+            <a:off x="2430259" y="2459569"/>
+            <a:ext cx="254576" cy="123112"/>
+          </a:xfrm>
+          <a:prstGeom prst="roundRect">
+            <a:avLst/>
+          </a:prstGeom>
+          <a:solidFill>
+            <a:schemeClr val="tx1">
+              <a:lumMod val="75000"/>
+              <a:lumOff val="25000"/>
+            </a:schemeClr>
+          </a:solidFill>
+          <a:ln w="6350">
+            <a:solidFill>
+              <a:schemeClr val="bg1"/>
+            </a:solidFill>
+          </a:ln>
+        </p:spPr>
+        <p:style>
+          <a:lnRef idx="2">
+            <a:schemeClr val="accent2"/>
+          </a:lnRef>
+          <a:fillRef idx="1">
+            <a:schemeClr val="lt1"/>
+          </a:fillRef>
+          <a:effectRef idx="0">
+            <a:schemeClr val="accent2"/>
+          </a:effectRef>
+          <a:fontRef idx="minor">
+            <a:schemeClr val="dk1"/>
+          </a:fontRef>
+        </p:style>
+        <p:txBody>
+          <a:bodyPr rot="0" spcFirstLastPara="0" vertOverflow="overflow" horzOverflow="overflow" vert="horz" wrap="square" lIns="91440" tIns="45720" rIns="91440" bIns="45720" numCol="1" spcCol="0" rtlCol="0" fromWordArt="0" anchor="ctr" anchorCtr="0" forceAA="0" compatLnSpc="1">
+            <a:prstTxWarp prst="textNoShape">
+              <a:avLst/>
+            </a:prstTxWarp>
+            <a:noAutofit/>
+          </a:bodyPr>
+          <a:lstStyle/>
+          <a:p>
+            <a:pPr algn="ctr"/>
+            <a:endParaRPr lang="en-CA"/>
+          </a:p>
+        </p:txBody>
+      </p:sp>
+      <p:sp>
+        <p:nvSpPr>
+          <p:cNvPr id="78" name="Rectangle 77"/>
+          <p:cNvSpPr/>
+          <p:nvPr/>
+        </p:nvSpPr>
+        <p:spPr>
+          <a:xfrm>
+            <a:off x="2465096" y="2459569"/>
+            <a:ext cx="112210" cy="123111"/>
+          </a:xfrm>
+          <a:prstGeom prst="rect">
+            <a:avLst/>
+          </a:prstGeom>
+        </p:spPr>
+        <p:txBody>
+          <a:bodyPr wrap="none" lIns="0" tIns="0" rIns="0" bIns="0">
+            <a:spAutoFit/>
+          </a:bodyPr>
+          <a:lstStyle/>
+          <a:p>
+            <a:r>
+              <a:rPr lang="en-CA" sz="800" dirty="0" smtClean="0">
+                <a:solidFill>
+                  <a:schemeClr val="bg1"/>
+                </a:solidFill>
+              </a:rPr>
+              <a:t>Ox</a:t>
+            </a:r>
+            <a:endParaRPr lang="en-CA" sz="800" dirty="0">
+              <a:solidFill>
+                <a:schemeClr val="bg1"/>
+              </a:solidFill>
+            </a:endParaRPr>
+          </a:p>
+        </p:txBody>
+      </p:sp>
+      <p:sp>
+        <p:nvSpPr>
+          <p:cNvPr id="79" name="Rounded Rectangle 78"/>
+          <p:cNvSpPr/>
+          <p:nvPr/>
+        </p:nvSpPr>
+        <p:spPr>
+          <a:xfrm>
+            <a:off x="2719831" y="2459569"/>
+            <a:ext cx="392584" cy="123112"/>
+          </a:xfrm>
+          <a:prstGeom prst="roundRect">
+            <a:avLst/>
+          </a:prstGeom>
+          <a:solidFill>
+            <a:schemeClr val="tx1">
+              <a:lumMod val="75000"/>
+              <a:lumOff val="25000"/>
+            </a:schemeClr>
+          </a:solidFill>
+          <a:ln w="6350">
+            <a:solidFill>
+              <a:schemeClr val="bg1"/>
+            </a:solidFill>
+          </a:ln>
+        </p:spPr>
+        <p:style>
+          <a:lnRef idx="2">
+            <a:schemeClr val="accent2"/>
+          </a:lnRef>
+          <a:fillRef idx="1">
+            <a:schemeClr val="lt1"/>
+          </a:fillRef>
+          <a:effectRef idx="0">
+            <a:schemeClr val="accent2"/>
+          </a:effectRef>
+          <a:fontRef idx="minor">
+            <a:schemeClr val="dk1"/>
+          </a:fontRef>
+        </p:style>
+        <p:txBody>
+          <a:bodyPr rot="0" spcFirstLastPara="0" vertOverflow="overflow" horzOverflow="overflow" vert="horz" wrap="square" lIns="91440" tIns="45720" rIns="91440" bIns="45720" numCol="1" spcCol="0" rtlCol="0" fromWordArt="0" anchor="ctr" anchorCtr="0" forceAA="0" compatLnSpc="1">
+            <a:prstTxWarp prst="textNoShape">
+              <a:avLst/>
+            </a:prstTxWarp>
+            <a:noAutofit/>
+          </a:bodyPr>
+          <a:lstStyle/>
+          <a:p>
+            <a:pPr algn="ctr"/>
+            <a:endParaRPr lang="en-CA"/>
+          </a:p>
+        </p:txBody>
+      </p:sp>
+      <p:sp>
+        <p:nvSpPr>
+          <p:cNvPr id="80" name="Rectangle 79"/>
+          <p:cNvSpPr/>
+          <p:nvPr/>
+        </p:nvSpPr>
+        <p:spPr>
+          <a:xfrm>
+            <a:off x="2795898" y="2459569"/>
+            <a:ext cx="240450" cy="123111"/>
+          </a:xfrm>
+          <a:prstGeom prst="rect">
+            <a:avLst/>
+          </a:prstGeom>
+        </p:spPr>
+        <p:txBody>
+          <a:bodyPr wrap="none" lIns="0" tIns="0" rIns="0" bIns="0">
+            <a:spAutoFit/>
+          </a:bodyPr>
+          <a:lstStyle/>
+          <a:p>
+            <a:r>
+              <a:rPr lang="en-CA" sz="800" dirty="0" smtClean="0">
+                <a:solidFill>
+                  <a:schemeClr val="bg1"/>
+                </a:solidFill>
+              </a:rPr>
+              <a:t>Stone</a:t>
+            </a:r>
+            <a:endParaRPr lang="en-CA" sz="800" dirty="0">
+              <a:solidFill>
+                <a:schemeClr val="bg1"/>
+              </a:solidFill>
+            </a:endParaRPr>
+          </a:p>
+        </p:txBody>
+      </p:sp>
       <p:sp>
         <p:nvSpPr>
           <p:cNvPr id="81" name="Rounded Rectangle 80"/>
@@ -13186,11 +13135,11 @@
   <p:clrMapOvr>
     <a:masterClrMapping/>
   </p:clrMapOvr>
-  <mc:AlternateContent xmlns:mc="http://schemas.openxmlformats.org/markup-compatibility/2006">
-    <mc:Choice xmlns:p14="http://schemas.microsoft.com/office/powerpoint/2010/main" Requires="p14">
+  <mc:AlternateContent xmlns:mc="http://schemas.openxmlformats.org/markup-compatibility/2006" xmlns:p14="http://schemas.microsoft.com/office/powerpoint/2010/main">
+    <mc:Choice Requires="p14">
       <p:transition spd="slow" p14:dur="2000"/>
     </mc:Choice>
-    <mc:Fallback>
+    <mc:Fallback xmlns="">
       <p:transition spd="slow"/>
     </mc:Fallback>
   </mc:AlternateContent>
@@ -15294,17 +15243,12 @@
               </a:rPr>
               <a:t>Steatite</a:t>
             </a:r>
-            <a:endParaRPr lang="en-CA" sz="800" dirty="0">
-              <a:solidFill>
-                <a:schemeClr val="bg1"/>
-              </a:solidFill>
-            </a:endParaRPr>
           </a:p>
         </p:txBody>
       </p:sp>
       <p:pic>
         <p:nvPicPr>
-          <p:cNvPr id="6148" name="Picture 4" descr="http://www.inuit.com/sites/inuit/gallery/pictures/1369090170374.jpg"/>
+          <p:cNvPr id="6150" name="Picture 6" descr="http://www.inuit.com/sites/inuit/gallery/pictures/1361316745573.jpg"/>
           <p:cNvPicPr>
             <a:picLocks noChangeAspect="1" noChangeArrowheads="1"/>
           </p:cNvPicPr>
@@ -15325,8 +15269,8 @@
         </p:blipFill>
         <p:spPr bwMode="auto">
           <a:xfrm>
-            <a:off x="2477737" y="1756034"/>
-            <a:ext cx="581760" cy="371356"/>
+            <a:off x="2456903" y="1744014"/>
+            <a:ext cx="601362" cy="395395"/>
           </a:xfrm>
           <a:prstGeom prst="rect">
             <a:avLst/>
@@ -15343,298 +15287,9 @@
           </a:extLst>
         </p:spPr>
       </p:pic>
-      <p:sp>
-        <p:nvSpPr>
-          <p:cNvPr id="75" name="Rounded Rectangle 74"/>
-          <p:cNvSpPr/>
-          <p:nvPr/>
-        </p:nvSpPr>
-        <p:spPr>
-          <a:xfrm>
-            <a:off x="2430258" y="2307169"/>
-            <a:ext cx="675629" cy="123112"/>
-          </a:xfrm>
-          <a:prstGeom prst="roundRect">
-            <a:avLst/>
-          </a:prstGeom>
-          <a:solidFill>
-            <a:schemeClr val="tx1">
-              <a:lumMod val="75000"/>
-              <a:lumOff val="25000"/>
-            </a:schemeClr>
-          </a:solidFill>
-          <a:ln w="6350">
-            <a:solidFill>
-              <a:schemeClr val="bg1"/>
-            </a:solidFill>
-          </a:ln>
-        </p:spPr>
-        <p:style>
-          <a:lnRef idx="2">
-            <a:schemeClr val="accent2"/>
-          </a:lnRef>
-          <a:fillRef idx="1">
-            <a:schemeClr val="lt1"/>
-          </a:fillRef>
-          <a:effectRef idx="0">
-            <a:schemeClr val="accent2"/>
-          </a:effectRef>
-          <a:fontRef idx="minor">
-            <a:schemeClr val="dk1"/>
-          </a:fontRef>
-        </p:style>
-        <p:txBody>
-          <a:bodyPr rot="0" spcFirstLastPara="0" vertOverflow="overflow" horzOverflow="overflow" vert="horz" wrap="square" lIns="91440" tIns="45720" rIns="91440" bIns="45720" numCol="1" spcCol="0" rtlCol="0" fromWordArt="0" anchor="ctr" anchorCtr="0" forceAA="0" compatLnSpc="1">
-            <a:prstTxWarp prst="textNoShape">
-              <a:avLst/>
-            </a:prstTxWarp>
-            <a:noAutofit/>
-          </a:bodyPr>
-          <a:lstStyle/>
-          <a:p>
-            <a:pPr algn="ctr"/>
-            <a:endParaRPr lang="en-CA"/>
-          </a:p>
-        </p:txBody>
-      </p:sp>
-      <p:sp>
-        <p:nvSpPr>
-          <p:cNvPr id="76" name="Rectangle 75"/>
-          <p:cNvSpPr/>
-          <p:nvPr/>
-        </p:nvSpPr>
-        <p:spPr>
-          <a:xfrm>
-            <a:off x="2465096" y="2307170"/>
-            <a:ext cx="501740" cy="123111"/>
-          </a:xfrm>
-          <a:prstGeom prst="rect">
-            <a:avLst/>
-          </a:prstGeom>
-        </p:spPr>
-        <p:txBody>
-          <a:bodyPr wrap="none" lIns="0" tIns="0" rIns="0" bIns="0">
-            <a:spAutoFit/>
-          </a:bodyPr>
-          <a:lstStyle/>
-          <a:p>
-            <a:r>
-              <a:rPr lang="en-CA" sz="800" dirty="0" err="1">
-                <a:solidFill>
-                  <a:schemeClr val="bg1"/>
-                </a:solidFill>
-              </a:rPr>
-              <a:t>Barnabus</a:t>
-            </a:r>
-            <a:r>
-              <a:rPr lang="en-CA" sz="800" dirty="0">
-                <a:solidFill>
-                  <a:schemeClr val="bg1"/>
-                </a:solidFill>
-              </a:rPr>
-              <a:t> </a:t>
-            </a:r>
-            <a:r>
-              <a:rPr lang="en-CA" sz="800" dirty="0" smtClean="0">
-                <a:solidFill>
-                  <a:schemeClr val="bg1"/>
-                </a:solidFill>
-              </a:rPr>
-              <a:t>A.</a:t>
-            </a:r>
-            <a:endParaRPr lang="en-CA" sz="800" dirty="0">
-              <a:solidFill>
-                <a:schemeClr val="bg1"/>
-              </a:solidFill>
-            </a:endParaRPr>
-          </a:p>
-        </p:txBody>
-      </p:sp>
-      <p:sp>
-        <p:nvSpPr>
-          <p:cNvPr id="77" name="Rounded Rectangle 76"/>
-          <p:cNvSpPr/>
-          <p:nvPr/>
-        </p:nvSpPr>
-        <p:spPr>
-          <a:xfrm>
-            <a:off x="2430259" y="2459569"/>
-            <a:ext cx="254576" cy="123112"/>
-          </a:xfrm>
-          <a:prstGeom prst="roundRect">
-            <a:avLst/>
-          </a:prstGeom>
-          <a:solidFill>
-            <a:schemeClr val="tx1">
-              <a:lumMod val="75000"/>
-              <a:lumOff val="25000"/>
-            </a:schemeClr>
-          </a:solidFill>
-          <a:ln w="6350">
-            <a:solidFill>
-              <a:schemeClr val="bg1"/>
-            </a:solidFill>
-          </a:ln>
-        </p:spPr>
-        <p:style>
-          <a:lnRef idx="2">
-            <a:schemeClr val="accent2"/>
-          </a:lnRef>
-          <a:fillRef idx="1">
-            <a:schemeClr val="lt1"/>
-          </a:fillRef>
-          <a:effectRef idx="0">
-            <a:schemeClr val="accent2"/>
-          </a:effectRef>
-          <a:fontRef idx="minor">
-            <a:schemeClr val="dk1"/>
-          </a:fontRef>
-        </p:style>
-        <p:txBody>
-          <a:bodyPr rot="0" spcFirstLastPara="0" vertOverflow="overflow" horzOverflow="overflow" vert="horz" wrap="square" lIns="91440" tIns="45720" rIns="91440" bIns="45720" numCol="1" spcCol="0" rtlCol="0" fromWordArt="0" anchor="ctr" anchorCtr="0" forceAA="0" compatLnSpc="1">
-            <a:prstTxWarp prst="textNoShape">
-              <a:avLst/>
-            </a:prstTxWarp>
-            <a:noAutofit/>
-          </a:bodyPr>
-          <a:lstStyle/>
-          <a:p>
-            <a:pPr algn="ctr"/>
-            <a:endParaRPr lang="en-CA"/>
-          </a:p>
-        </p:txBody>
-      </p:sp>
-      <p:sp>
-        <p:nvSpPr>
-          <p:cNvPr id="78" name="Rectangle 77"/>
-          <p:cNvSpPr/>
-          <p:nvPr/>
-        </p:nvSpPr>
-        <p:spPr>
-          <a:xfrm>
-            <a:off x="2465096" y="2459569"/>
-            <a:ext cx="112210" cy="123111"/>
-          </a:xfrm>
-          <a:prstGeom prst="rect">
-            <a:avLst/>
-          </a:prstGeom>
-        </p:spPr>
-        <p:txBody>
-          <a:bodyPr wrap="none" lIns="0" tIns="0" rIns="0" bIns="0">
-            <a:spAutoFit/>
-          </a:bodyPr>
-          <a:lstStyle/>
-          <a:p>
-            <a:r>
-              <a:rPr lang="en-CA" sz="800" dirty="0" smtClean="0">
-                <a:solidFill>
-                  <a:schemeClr val="bg1"/>
-                </a:solidFill>
-              </a:rPr>
-              <a:t>Ox</a:t>
-            </a:r>
-            <a:endParaRPr lang="en-CA" sz="800" dirty="0">
-              <a:solidFill>
-                <a:schemeClr val="bg1"/>
-              </a:solidFill>
-            </a:endParaRPr>
-          </a:p>
-        </p:txBody>
-      </p:sp>
-      <p:sp>
-        <p:nvSpPr>
-          <p:cNvPr id="79" name="Rounded Rectangle 78"/>
-          <p:cNvSpPr/>
-          <p:nvPr/>
-        </p:nvSpPr>
-        <p:spPr>
-          <a:xfrm>
-            <a:off x="2719831" y="2459569"/>
-            <a:ext cx="392584" cy="123112"/>
-          </a:xfrm>
-          <a:prstGeom prst="roundRect">
-            <a:avLst/>
-          </a:prstGeom>
-          <a:solidFill>
-            <a:schemeClr val="tx1">
-              <a:lumMod val="75000"/>
-              <a:lumOff val="25000"/>
-            </a:schemeClr>
-          </a:solidFill>
-          <a:ln w="6350">
-            <a:solidFill>
-              <a:schemeClr val="bg1"/>
-            </a:solidFill>
-          </a:ln>
-        </p:spPr>
-        <p:style>
-          <a:lnRef idx="2">
-            <a:schemeClr val="accent2"/>
-          </a:lnRef>
-          <a:fillRef idx="1">
-            <a:schemeClr val="lt1"/>
-          </a:fillRef>
-          <a:effectRef idx="0">
-            <a:schemeClr val="accent2"/>
-          </a:effectRef>
-          <a:fontRef idx="minor">
-            <a:schemeClr val="dk1"/>
-          </a:fontRef>
-        </p:style>
-        <p:txBody>
-          <a:bodyPr rot="0" spcFirstLastPara="0" vertOverflow="overflow" horzOverflow="overflow" vert="horz" wrap="square" lIns="91440" tIns="45720" rIns="91440" bIns="45720" numCol="1" spcCol="0" rtlCol="0" fromWordArt="0" anchor="ctr" anchorCtr="0" forceAA="0" compatLnSpc="1">
-            <a:prstTxWarp prst="textNoShape">
-              <a:avLst/>
-            </a:prstTxWarp>
-            <a:noAutofit/>
-          </a:bodyPr>
-          <a:lstStyle/>
-          <a:p>
-            <a:pPr algn="ctr"/>
-            <a:endParaRPr lang="en-CA"/>
-          </a:p>
-        </p:txBody>
-      </p:sp>
-      <p:sp>
-        <p:nvSpPr>
-          <p:cNvPr id="80" name="Rectangle 79"/>
-          <p:cNvSpPr/>
-          <p:nvPr/>
-        </p:nvSpPr>
-        <p:spPr>
-          <a:xfrm>
-            <a:off x="2795898" y="2459569"/>
-            <a:ext cx="240450" cy="123111"/>
-          </a:xfrm>
-          <a:prstGeom prst="rect">
-            <a:avLst/>
-          </a:prstGeom>
-        </p:spPr>
-        <p:txBody>
-          <a:bodyPr wrap="none" lIns="0" tIns="0" rIns="0" bIns="0">
-            <a:spAutoFit/>
-          </a:bodyPr>
-          <a:lstStyle/>
-          <a:p>
-            <a:r>
-              <a:rPr lang="en-CA" sz="800" dirty="0" smtClean="0">
-                <a:solidFill>
-                  <a:schemeClr val="bg1"/>
-                </a:solidFill>
-              </a:rPr>
-              <a:t>Stone</a:t>
-            </a:r>
-            <a:endParaRPr lang="en-CA" sz="800" dirty="0">
-              <a:solidFill>
-                <a:schemeClr val="bg1"/>
-              </a:solidFill>
-            </a:endParaRPr>
-          </a:p>
-        </p:txBody>
-      </p:sp>
       <p:pic>
         <p:nvPicPr>
-          <p:cNvPr id="6150" name="Picture 6" descr="http://www.inuit.com/sites/inuit/gallery/pictures/1361316745573.jpg"/>
+          <p:cNvPr id="6148" name="Picture 4" descr="http://www.inuit.com/sites/inuit/gallery/pictures/1369090170374.jpg"/>
           <p:cNvPicPr>
             <a:picLocks noChangeAspect="1" noChangeArrowheads="1"/>
           </p:cNvPicPr>
@@ -15655,8 +15310,8 @@
         </p:blipFill>
         <p:spPr bwMode="auto">
           <a:xfrm>
-            <a:off x="290984" y="4062894"/>
-            <a:ext cx="601362" cy="395395"/>
+            <a:off x="298516" y="4031744"/>
+            <a:ext cx="581760" cy="371356"/>
           </a:xfrm>
           <a:prstGeom prst="rect">
             <a:avLst/>
@@ -15673,6 +15328,295 @@
           </a:extLst>
         </p:spPr>
       </p:pic>
+      <p:sp>
+        <p:nvSpPr>
+          <p:cNvPr id="75" name="Rounded Rectangle 74"/>
+          <p:cNvSpPr/>
+          <p:nvPr/>
+        </p:nvSpPr>
+        <p:spPr>
+          <a:xfrm>
+            <a:off x="2430258" y="2307169"/>
+            <a:ext cx="675629" cy="123112"/>
+          </a:xfrm>
+          <a:prstGeom prst="roundRect">
+            <a:avLst/>
+          </a:prstGeom>
+          <a:solidFill>
+            <a:schemeClr val="tx1">
+              <a:lumMod val="75000"/>
+              <a:lumOff val="25000"/>
+            </a:schemeClr>
+          </a:solidFill>
+          <a:ln w="6350">
+            <a:solidFill>
+              <a:schemeClr val="bg1"/>
+            </a:solidFill>
+          </a:ln>
+        </p:spPr>
+        <p:style>
+          <a:lnRef idx="2">
+            <a:schemeClr val="accent2"/>
+          </a:lnRef>
+          <a:fillRef idx="1">
+            <a:schemeClr val="lt1"/>
+          </a:fillRef>
+          <a:effectRef idx="0">
+            <a:schemeClr val="accent2"/>
+          </a:effectRef>
+          <a:fontRef idx="minor">
+            <a:schemeClr val="dk1"/>
+          </a:fontRef>
+        </p:style>
+        <p:txBody>
+          <a:bodyPr rot="0" spcFirstLastPara="0" vertOverflow="overflow" horzOverflow="overflow" vert="horz" wrap="square" lIns="91440" tIns="45720" rIns="91440" bIns="45720" numCol="1" spcCol="0" rtlCol="0" fromWordArt="0" anchor="ctr" anchorCtr="0" forceAA="0" compatLnSpc="1">
+            <a:prstTxWarp prst="textNoShape">
+              <a:avLst/>
+            </a:prstTxWarp>
+            <a:noAutofit/>
+          </a:bodyPr>
+          <a:lstStyle/>
+          <a:p>
+            <a:pPr algn="ctr"/>
+            <a:endParaRPr lang="en-CA"/>
+          </a:p>
+        </p:txBody>
+      </p:sp>
+      <p:sp>
+        <p:nvSpPr>
+          <p:cNvPr id="76" name="Rectangle 75"/>
+          <p:cNvSpPr/>
+          <p:nvPr/>
+        </p:nvSpPr>
+        <p:spPr>
+          <a:xfrm>
+            <a:off x="2465096" y="2307170"/>
+            <a:ext cx="501740" cy="123111"/>
+          </a:xfrm>
+          <a:prstGeom prst="rect">
+            <a:avLst/>
+          </a:prstGeom>
+        </p:spPr>
+        <p:txBody>
+          <a:bodyPr wrap="none" lIns="0" tIns="0" rIns="0" bIns="0">
+            <a:spAutoFit/>
+          </a:bodyPr>
+          <a:lstStyle/>
+          <a:p>
+            <a:r>
+              <a:rPr lang="en-CA" sz="800" dirty="0" err="1">
+                <a:solidFill>
+                  <a:schemeClr val="bg1"/>
+                </a:solidFill>
+              </a:rPr>
+              <a:t>Barnabus</a:t>
+            </a:r>
+            <a:r>
+              <a:rPr lang="en-CA" sz="800" dirty="0">
+                <a:solidFill>
+                  <a:schemeClr val="bg1"/>
+                </a:solidFill>
+              </a:rPr>
+              <a:t> </a:t>
+            </a:r>
+            <a:r>
+              <a:rPr lang="en-CA" sz="800" dirty="0" smtClean="0">
+                <a:solidFill>
+                  <a:schemeClr val="bg1"/>
+                </a:solidFill>
+              </a:rPr>
+              <a:t>A.</a:t>
+            </a:r>
+            <a:endParaRPr lang="en-CA" sz="800" dirty="0">
+              <a:solidFill>
+                <a:schemeClr val="bg1"/>
+              </a:solidFill>
+            </a:endParaRPr>
+          </a:p>
+        </p:txBody>
+      </p:sp>
+      <p:sp>
+        <p:nvSpPr>
+          <p:cNvPr id="77" name="Rounded Rectangle 76"/>
+          <p:cNvSpPr/>
+          <p:nvPr/>
+        </p:nvSpPr>
+        <p:spPr>
+          <a:xfrm>
+            <a:off x="2430259" y="2459569"/>
+            <a:ext cx="254576" cy="123112"/>
+          </a:xfrm>
+          <a:prstGeom prst="roundRect">
+            <a:avLst/>
+          </a:prstGeom>
+          <a:solidFill>
+            <a:schemeClr val="tx1">
+              <a:lumMod val="75000"/>
+              <a:lumOff val="25000"/>
+            </a:schemeClr>
+          </a:solidFill>
+          <a:ln w="6350">
+            <a:solidFill>
+              <a:schemeClr val="bg1"/>
+            </a:solidFill>
+          </a:ln>
+        </p:spPr>
+        <p:style>
+          <a:lnRef idx="2">
+            <a:schemeClr val="accent2"/>
+          </a:lnRef>
+          <a:fillRef idx="1">
+            <a:schemeClr val="lt1"/>
+          </a:fillRef>
+          <a:effectRef idx="0">
+            <a:schemeClr val="accent2"/>
+          </a:effectRef>
+          <a:fontRef idx="minor">
+            <a:schemeClr val="dk1"/>
+          </a:fontRef>
+        </p:style>
+        <p:txBody>
+          <a:bodyPr rot="0" spcFirstLastPara="0" vertOverflow="overflow" horzOverflow="overflow" vert="horz" wrap="square" lIns="91440" tIns="45720" rIns="91440" bIns="45720" numCol="1" spcCol="0" rtlCol="0" fromWordArt="0" anchor="ctr" anchorCtr="0" forceAA="0" compatLnSpc="1">
+            <a:prstTxWarp prst="textNoShape">
+              <a:avLst/>
+            </a:prstTxWarp>
+            <a:noAutofit/>
+          </a:bodyPr>
+          <a:lstStyle/>
+          <a:p>
+            <a:pPr algn="ctr"/>
+            <a:endParaRPr lang="en-CA"/>
+          </a:p>
+        </p:txBody>
+      </p:sp>
+      <p:sp>
+        <p:nvSpPr>
+          <p:cNvPr id="78" name="Rectangle 77"/>
+          <p:cNvSpPr/>
+          <p:nvPr/>
+        </p:nvSpPr>
+        <p:spPr>
+          <a:xfrm>
+            <a:off x="2465096" y="2459569"/>
+            <a:ext cx="112210" cy="123111"/>
+          </a:xfrm>
+          <a:prstGeom prst="rect">
+            <a:avLst/>
+          </a:prstGeom>
+        </p:spPr>
+        <p:txBody>
+          <a:bodyPr wrap="none" lIns="0" tIns="0" rIns="0" bIns="0">
+            <a:spAutoFit/>
+          </a:bodyPr>
+          <a:lstStyle/>
+          <a:p>
+            <a:r>
+              <a:rPr lang="en-CA" sz="800" dirty="0" smtClean="0">
+                <a:solidFill>
+                  <a:schemeClr val="bg1"/>
+                </a:solidFill>
+              </a:rPr>
+              <a:t>Ox</a:t>
+            </a:r>
+            <a:endParaRPr lang="en-CA" sz="800" dirty="0">
+              <a:solidFill>
+                <a:schemeClr val="bg1"/>
+              </a:solidFill>
+            </a:endParaRPr>
+          </a:p>
+        </p:txBody>
+      </p:sp>
+      <p:sp>
+        <p:nvSpPr>
+          <p:cNvPr id="79" name="Rounded Rectangle 78"/>
+          <p:cNvSpPr/>
+          <p:nvPr/>
+        </p:nvSpPr>
+        <p:spPr>
+          <a:xfrm>
+            <a:off x="2719831" y="2459569"/>
+            <a:ext cx="392584" cy="123112"/>
+          </a:xfrm>
+          <a:prstGeom prst="roundRect">
+            <a:avLst/>
+          </a:prstGeom>
+          <a:solidFill>
+            <a:schemeClr val="tx1">
+              <a:lumMod val="75000"/>
+              <a:lumOff val="25000"/>
+            </a:schemeClr>
+          </a:solidFill>
+          <a:ln w="6350">
+            <a:solidFill>
+              <a:schemeClr val="bg1"/>
+            </a:solidFill>
+          </a:ln>
+        </p:spPr>
+        <p:style>
+          <a:lnRef idx="2">
+            <a:schemeClr val="accent2"/>
+          </a:lnRef>
+          <a:fillRef idx="1">
+            <a:schemeClr val="lt1"/>
+          </a:fillRef>
+          <a:effectRef idx="0">
+            <a:schemeClr val="accent2"/>
+          </a:effectRef>
+          <a:fontRef idx="minor">
+            <a:schemeClr val="dk1"/>
+          </a:fontRef>
+        </p:style>
+        <p:txBody>
+          <a:bodyPr rot="0" spcFirstLastPara="0" vertOverflow="overflow" horzOverflow="overflow" vert="horz" wrap="square" lIns="91440" tIns="45720" rIns="91440" bIns="45720" numCol="1" spcCol="0" rtlCol="0" fromWordArt="0" anchor="ctr" anchorCtr="0" forceAA="0" compatLnSpc="1">
+            <a:prstTxWarp prst="textNoShape">
+              <a:avLst/>
+            </a:prstTxWarp>
+            <a:noAutofit/>
+          </a:bodyPr>
+          <a:lstStyle/>
+          <a:p>
+            <a:pPr algn="ctr"/>
+            <a:endParaRPr lang="en-CA"/>
+          </a:p>
+        </p:txBody>
+      </p:sp>
+      <p:sp>
+        <p:nvSpPr>
+          <p:cNvPr id="80" name="Rectangle 79"/>
+          <p:cNvSpPr/>
+          <p:nvPr/>
+        </p:nvSpPr>
+        <p:spPr>
+          <a:xfrm>
+            <a:off x="2795898" y="2459569"/>
+            <a:ext cx="240450" cy="123111"/>
+          </a:xfrm>
+          <a:prstGeom prst="rect">
+            <a:avLst/>
+          </a:prstGeom>
+        </p:spPr>
+        <p:txBody>
+          <a:bodyPr wrap="none" lIns="0" tIns="0" rIns="0" bIns="0">
+            <a:spAutoFit/>
+          </a:bodyPr>
+          <a:lstStyle/>
+          <a:p>
+            <a:r>
+              <a:rPr lang="en-CA" sz="800" dirty="0" smtClean="0">
+                <a:solidFill>
+                  <a:schemeClr val="bg1"/>
+                </a:solidFill>
+              </a:rPr>
+              <a:t>Stone</a:t>
+            </a:r>
+            <a:endParaRPr lang="en-CA" sz="800" dirty="0">
+              <a:solidFill>
+                <a:schemeClr val="bg1"/>
+              </a:solidFill>
+            </a:endParaRPr>
+          </a:p>
+        </p:txBody>
+      </p:sp>
       <p:sp>
         <p:nvSpPr>
           <p:cNvPr id="81" name="Rounded Rectangle 80"/>
@@ -16861,20 +16805,20 @@
     </p:spTree>
     <p:extLst>
       <p:ext uri="{BB962C8B-B14F-4D97-AF65-F5344CB8AC3E}">
-        <p14:creationId xmlns:p14="http://schemas.microsoft.com/office/powerpoint/2010/main" val="2674680013"/>
+        <p14:creationId xmlns:p14="http://schemas.microsoft.com/office/powerpoint/2010/main" val="3607330314"/>
       </p:ext>
     </p:extLst>
   </p:cSld>
   <p:clrMapOvr>
     <a:masterClrMapping/>
   </p:clrMapOvr>
-  <mc:AlternateContent xmlns:mc="http://schemas.openxmlformats.org/markup-compatibility/2006">
-    <mc:Choice xmlns:p14="http://schemas.microsoft.com/office/powerpoint/2010/main" Requires="p14">
+  <mc:AlternateContent xmlns:mc="http://schemas.openxmlformats.org/markup-compatibility/2006" xmlns:p14="http://schemas.microsoft.com/office/powerpoint/2010/main">
+    <mc:Choice Requires="p14">
       <p:transition spd="med" p14:dur="700">
         <p:fade/>
       </p:transition>
     </mc:Choice>
-    <mc:Fallback>
+    <mc:Fallback xmlns="">
       <p:transition spd="med">
         <p:fade/>
       </p:transition>
@@ -19172,55 +19116,9 @@
               </a:rPr>
               <a:t>Steatite</a:t>
             </a:r>
-            <a:endParaRPr lang="en-CA" sz="800" dirty="0">
-              <a:solidFill>
-                <a:schemeClr val="bg1"/>
-              </a:solidFill>
-            </a:endParaRPr>
-          </a:p>
-        </p:txBody>
-      </p:sp>
-      <p:pic>
-        <p:nvPicPr>
-          <p:cNvPr id="6148" name="Picture 4" descr="http://www.inuit.com/sites/inuit/gallery/pictures/1369090170374.jpg"/>
-          <p:cNvPicPr>
-            <a:picLocks noChangeAspect="1" noChangeArrowheads="1"/>
-          </p:cNvPicPr>
-          <p:nvPr/>
-        </p:nvPicPr>
-        <p:blipFill>
-          <a:blip r:embed="rId8" cstate="print">
-            <a:extLst>
-              <a:ext uri="{28A0092B-C50C-407E-A947-70E740481C1C}">
-                <a14:useLocalDpi xmlns:a14="http://schemas.microsoft.com/office/drawing/2010/main" val="0"/>
-              </a:ext>
-            </a:extLst>
-          </a:blip>
-          <a:srcRect/>
-          <a:stretch>
-            <a:fillRect/>
-          </a:stretch>
-        </p:blipFill>
-        <p:spPr bwMode="auto">
-          <a:xfrm>
-            <a:off x="2477737" y="1756034"/>
-            <a:ext cx="581760" cy="371356"/>
-          </a:xfrm>
-          <a:prstGeom prst="rect">
-            <a:avLst/>
-          </a:prstGeom>
-          <a:noFill/>
-          <a:extLst>
-            <a:ext uri="{909E8E84-426E-40DD-AFC4-6F175D3DCCD1}">
-              <a14:hiddenFill xmlns:a14="http://schemas.microsoft.com/office/drawing/2010/main">
-                <a:solidFill>
-                  <a:srgbClr val="FFFFFF"/>
-                </a:solidFill>
-              </a14:hiddenFill>
-            </a:ext>
-          </a:extLst>
-        </p:spPr>
-      </p:pic>
+          </a:p>
+        </p:txBody>
+      </p:sp>
       <p:sp>
         <p:nvSpPr>
           <p:cNvPr id="75" name="Rounded Rectangle 74"/>
@@ -19510,47 +19408,6 @@
           </a:p>
         </p:txBody>
       </p:sp>
-      <p:pic>
-        <p:nvPicPr>
-          <p:cNvPr id="6150" name="Picture 6" descr="http://www.inuit.com/sites/inuit/gallery/pictures/1361316745573.jpg"/>
-          <p:cNvPicPr>
-            <a:picLocks noChangeAspect="1" noChangeArrowheads="1"/>
-          </p:cNvPicPr>
-          <p:nvPr/>
-        </p:nvPicPr>
-        <p:blipFill>
-          <a:blip r:embed="rId9" cstate="print">
-            <a:extLst>
-              <a:ext uri="{28A0092B-C50C-407E-A947-70E740481C1C}">
-                <a14:useLocalDpi xmlns:a14="http://schemas.microsoft.com/office/drawing/2010/main" val="0"/>
-              </a:ext>
-            </a:extLst>
-          </a:blip>
-          <a:srcRect/>
-          <a:stretch>
-            <a:fillRect/>
-          </a:stretch>
-        </p:blipFill>
-        <p:spPr bwMode="auto">
-          <a:xfrm>
-            <a:off x="290984" y="4062894"/>
-            <a:ext cx="601362" cy="395395"/>
-          </a:xfrm>
-          <a:prstGeom prst="rect">
-            <a:avLst/>
-          </a:prstGeom>
-          <a:noFill/>
-          <a:extLst>
-            <a:ext uri="{909E8E84-426E-40DD-AFC4-6F175D3DCCD1}">
-              <a14:hiddenFill xmlns:a14="http://schemas.microsoft.com/office/drawing/2010/main">
-                <a:solidFill>
-                  <a:srgbClr val="FFFFFF"/>
-                </a:solidFill>
-              </a14:hiddenFill>
-            </a:ext>
-          </a:extLst>
-        </p:spPr>
-      </p:pic>
       <p:sp>
         <p:nvSpPr>
           <p:cNvPr id="81" name="Rounded Rectangle 80"/>
@@ -19997,7 +19854,7 @@
           <p:nvPr/>
         </p:nvPicPr>
         <p:blipFill>
-          <a:blip r:embed="rId10" cstate="print">
+          <a:blip r:embed="rId8" cstate="print">
             <a:extLst>
               <a:ext uri="{28A0092B-C50C-407E-A947-70E740481C1C}">
                 <a14:useLocalDpi xmlns:a14="http://schemas.microsoft.com/office/drawing/2010/main" val="0"/>
@@ -20051,7 +19908,7 @@
           <p:nvPr/>
         </p:nvPicPr>
         <p:blipFill>
-          <a:blip r:embed="rId11" cstate="print">
+          <a:blip r:embed="rId9" cstate="print">
             <a:extLst>
               <a:ext uri="{28A0092B-C50C-407E-A947-70E740481C1C}">
                 <a14:useLocalDpi xmlns:a14="http://schemas.microsoft.com/office/drawing/2010/main" val="0"/>
@@ -20367,6 +20224,278 @@
       <p:pic>
         <p:nvPicPr>
           <p:cNvPr id="6154" name="Picture 10" descr="http://www.inuit.com/sites/inuit/gallery/pictures/1354314679745.jpg"/>
+          <p:cNvPicPr>
+            <a:picLocks noChangeAspect="1" noChangeArrowheads="1"/>
+          </p:cNvPicPr>
+          <p:nvPr/>
+        </p:nvPicPr>
+        <p:blipFill>
+          <a:blip r:embed="rId10" cstate="print">
+            <a:extLst>
+              <a:ext uri="{28A0092B-C50C-407E-A947-70E740481C1C}">
+                <a14:useLocalDpi xmlns:a14="http://schemas.microsoft.com/office/drawing/2010/main" val="0"/>
+              </a:ext>
+            </a:extLst>
+          </a:blip>
+          <a:srcRect/>
+          <a:stretch>
+            <a:fillRect/>
+          </a:stretch>
+        </p:blipFill>
+        <p:spPr bwMode="auto">
+          <a:xfrm>
+            <a:off x="2610990" y="4031093"/>
+            <a:ext cx="306000" cy="459000"/>
+          </a:xfrm>
+          <a:prstGeom prst="rect">
+            <a:avLst/>
+          </a:prstGeom>
+          <a:noFill/>
+          <a:extLst>
+            <a:ext uri="{909E8E84-426E-40DD-AFC4-6F175D3DCCD1}">
+              <a14:hiddenFill xmlns:a14="http://schemas.microsoft.com/office/drawing/2010/main">
+                <a:solidFill>
+                  <a:srgbClr val="FFFFFF"/>
+                </a:solidFill>
+              </a14:hiddenFill>
+            </a:ext>
+          </a:extLst>
+        </p:spPr>
+      </p:pic>
+      <p:sp>
+        <p:nvSpPr>
+          <p:cNvPr id="98" name="Rounded Rectangle 97"/>
+          <p:cNvSpPr/>
+          <p:nvPr/>
+        </p:nvSpPr>
+        <p:spPr>
+          <a:xfrm>
+            <a:off x="2420568" y="4605314"/>
+            <a:ext cx="675629" cy="123112"/>
+          </a:xfrm>
+          <a:prstGeom prst="roundRect">
+            <a:avLst/>
+          </a:prstGeom>
+          <a:solidFill>
+            <a:schemeClr val="tx1">
+              <a:lumMod val="75000"/>
+              <a:lumOff val="25000"/>
+            </a:schemeClr>
+          </a:solidFill>
+          <a:ln w="6350">
+            <a:solidFill>
+              <a:schemeClr val="bg1"/>
+            </a:solidFill>
+          </a:ln>
+        </p:spPr>
+        <p:style>
+          <a:lnRef idx="2">
+            <a:schemeClr val="accent2"/>
+          </a:lnRef>
+          <a:fillRef idx="1">
+            <a:schemeClr val="lt1"/>
+          </a:fillRef>
+          <a:effectRef idx="0">
+            <a:schemeClr val="accent2"/>
+          </a:effectRef>
+          <a:fontRef idx="minor">
+            <a:schemeClr val="dk1"/>
+          </a:fontRef>
+        </p:style>
+        <p:txBody>
+          <a:bodyPr rot="0" spcFirstLastPara="0" vertOverflow="overflow" horzOverflow="overflow" vert="horz" wrap="square" lIns="91440" tIns="45720" rIns="91440" bIns="45720" numCol="1" spcCol="0" rtlCol="0" fromWordArt="0" anchor="ctr" anchorCtr="0" forceAA="0" compatLnSpc="1">
+            <a:prstTxWarp prst="textNoShape">
+              <a:avLst/>
+            </a:prstTxWarp>
+            <a:noAutofit/>
+          </a:bodyPr>
+          <a:lstStyle/>
+          <a:p>
+            <a:pPr algn="ctr"/>
+            <a:endParaRPr lang="en-CA"/>
+          </a:p>
+        </p:txBody>
+      </p:sp>
+      <p:sp>
+        <p:nvSpPr>
+          <p:cNvPr id="99" name="Rectangle 98"/>
+          <p:cNvSpPr/>
+          <p:nvPr/>
+        </p:nvSpPr>
+        <p:spPr>
+          <a:xfrm>
+            <a:off x="2455406" y="4605315"/>
+            <a:ext cx="537006" cy="123111"/>
+          </a:xfrm>
+          <a:prstGeom prst="rect">
+            <a:avLst/>
+          </a:prstGeom>
+        </p:spPr>
+        <p:txBody>
+          <a:bodyPr wrap="none" lIns="0" tIns="0" rIns="0" bIns="0">
+            <a:spAutoFit/>
+          </a:bodyPr>
+          <a:lstStyle/>
+          <a:p>
+            <a:r>
+              <a:rPr lang="en-CA" sz="800" dirty="0" err="1" smtClean="0">
+                <a:solidFill>
+                  <a:schemeClr val="bg1"/>
+                </a:solidFill>
+              </a:rPr>
+              <a:t>Anowtalik</a:t>
+            </a:r>
+            <a:r>
+              <a:rPr lang="en-CA" sz="800" dirty="0" smtClean="0">
+                <a:solidFill>
+                  <a:schemeClr val="bg1"/>
+                </a:solidFill>
+              </a:rPr>
+              <a:t>, L.</a:t>
+            </a:r>
+            <a:endParaRPr lang="en-CA" sz="800" dirty="0">
+              <a:solidFill>
+                <a:schemeClr val="bg1"/>
+              </a:solidFill>
+            </a:endParaRPr>
+          </a:p>
+        </p:txBody>
+      </p:sp>
+      <p:sp>
+        <p:nvSpPr>
+          <p:cNvPr id="100" name="Rounded Rectangle 99"/>
+          <p:cNvSpPr/>
+          <p:nvPr/>
+        </p:nvSpPr>
+        <p:spPr>
+          <a:xfrm>
+            <a:off x="2420568" y="4757714"/>
+            <a:ext cx="353491" cy="123112"/>
+          </a:xfrm>
+          <a:prstGeom prst="roundRect">
+            <a:avLst/>
+          </a:prstGeom>
+          <a:solidFill>
+            <a:schemeClr val="tx1">
+              <a:lumMod val="75000"/>
+              <a:lumOff val="25000"/>
+            </a:schemeClr>
+          </a:solidFill>
+          <a:ln w="6350">
+            <a:solidFill>
+              <a:schemeClr val="bg1"/>
+            </a:solidFill>
+          </a:ln>
+        </p:spPr>
+        <p:style>
+          <a:lnRef idx="2">
+            <a:schemeClr val="accent2"/>
+          </a:lnRef>
+          <a:fillRef idx="1">
+            <a:schemeClr val="lt1"/>
+          </a:fillRef>
+          <a:effectRef idx="0">
+            <a:schemeClr val="accent2"/>
+          </a:effectRef>
+          <a:fontRef idx="minor">
+            <a:schemeClr val="dk1"/>
+          </a:fontRef>
+        </p:style>
+        <p:txBody>
+          <a:bodyPr rot="0" spcFirstLastPara="0" vertOverflow="overflow" horzOverflow="overflow" vert="horz" wrap="square" lIns="91440" tIns="45720" rIns="91440" bIns="45720" numCol="1" spcCol="0" rtlCol="0" fromWordArt="0" anchor="ctr" anchorCtr="0" forceAA="0" compatLnSpc="1">
+            <a:prstTxWarp prst="textNoShape">
+              <a:avLst/>
+            </a:prstTxWarp>
+            <a:noAutofit/>
+          </a:bodyPr>
+          <a:lstStyle/>
+          <a:p>
+            <a:pPr algn="ctr"/>
+            <a:endParaRPr lang="en-CA"/>
+          </a:p>
+        </p:txBody>
+      </p:sp>
+      <p:sp>
+        <p:nvSpPr>
+          <p:cNvPr id="101" name="Rectangle 100"/>
+          <p:cNvSpPr/>
+          <p:nvPr/>
+        </p:nvSpPr>
+        <p:spPr>
+          <a:xfrm>
+            <a:off x="2455406" y="4757714"/>
+            <a:ext cx="258084" cy="123111"/>
+          </a:xfrm>
+          <a:prstGeom prst="rect">
+            <a:avLst/>
+          </a:prstGeom>
+        </p:spPr>
+        <p:txBody>
+          <a:bodyPr wrap="none" lIns="0" tIns="0" rIns="0" bIns="0">
+            <a:spAutoFit/>
+          </a:bodyPr>
+          <a:lstStyle/>
+          <a:p>
+            <a:r>
+              <a:rPr lang="en-CA" sz="800" dirty="0" smtClean="0">
+                <a:solidFill>
+                  <a:schemeClr val="bg1"/>
+                </a:solidFill>
+              </a:rPr>
+              <a:t>Antler</a:t>
+            </a:r>
+            <a:endParaRPr lang="en-CA" sz="800" dirty="0">
+              <a:solidFill>
+                <a:schemeClr val="bg1"/>
+              </a:solidFill>
+            </a:endParaRPr>
+          </a:p>
+        </p:txBody>
+      </p:sp>
+      <p:pic>
+        <p:nvPicPr>
+          <p:cNvPr id="102" name="Picture 6" descr="http://www.inuit.com/sites/inuit/gallery/pictures/1361316745573.jpg"/>
+          <p:cNvPicPr>
+            <a:picLocks noChangeAspect="1" noChangeArrowheads="1"/>
+          </p:cNvPicPr>
+          <p:nvPr/>
+        </p:nvPicPr>
+        <p:blipFill>
+          <a:blip r:embed="rId11" cstate="print">
+            <a:extLst>
+              <a:ext uri="{28A0092B-C50C-407E-A947-70E740481C1C}">
+                <a14:useLocalDpi xmlns:a14="http://schemas.microsoft.com/office/drawing/2010/main" val="0"/>
+              </a:ext>
+            </a:extLst>
+          </a:blip>
+          <a:srcRect/>
+          <a:stretch>
+            <a:fillRect/>
+          </a:stretch>
+        </p:blipFill>
+        <p:spPr bwMode="auto">
+          <a:xfrm>
+            <a:off x="2456903" y="1744014"/>
+            <a:ext cx="601362" cy="395395"/>
+          </a:xfrm>
+          <a:prstGeom prst="rect">
+            <a:avLst/>
+          </a:prstGeom>
+          <a:noFill/>
+          <a:extLst>
+            <a:ext uri="{909E8E84-426E-40DD-AFC4-6F175D3DCCD1}">
+              <a14:hiddenFill xmlns:a14="http://schemas.microsoft.com/office/drawing/2010/main">
+                <a:solidFill>
+                  <a:srgbClr val="FFFFFF"/>
+                </a:solidFill>
+              </a14:hiddenFill>
+            </a:ext>
+          </a:extLst>
+        </p:spPr>
+      </p:pic>
+      <p:pic>
+        <p:nvPicPr>
+          <p:cNvPr id="104" name="Picture 4" descr="http://www.inuit.com/sites/inuit/gallery/pictures/1369090170374.jpg"/>
           <p:cNvPicPr>
             <a:picLocks noChangeAspect="1" noChangeArrowheads="1"/>
           </p:cNvPicPr>
@@ -20387,8 +20516,8 @@
         </p:blipFill>
         <p:spPr bwMode="auto">
           <a:xfrm>
-            <a:off x="2610990" y="4031093"/>
-            <a:ext cx="306000" cy="459000"/>
+            <a:off x="298516" y="4031744"/>
+            <a:ext cx="581760" cy="371356"/>
           </a:xfrm>
           <a:prstGeom prst="rect">
             <a:avLst/>
@@ -20405,196 +20534,6 @@
           </a:extLst>
         </p:spPr>
       </p:pic>
-      <p:sp>
-        <p:nvSpPr>
-          <p:cNvPr id="98" name="Rounded Rectangle 97"/>
-          <p:cNvSpPr/>
-          <p:nvPr/>
-        </p:nvSpPr>
-        <p:spPr>
-          <a:xfrm>
-            <a:off x="2420568" y="4605314"/>
-            <a:ext cx="675629" cy="123112"/>
-          </a:xfrm>
-          <a:prstGeom prst="roundRect">
-            <a:avLst/>
-          </a:prstGeom>
-          <a:solidFill>
-            <a:schemeClr val="tx1">
-              <a:lumMod val="75000"/>
-              <a:lumOff val="25000"/>
-            </a:schemeClr>
-          </a:solidFill>
-          <a:ln w="6350">
-            <a:solidFill>
-              <a:schemeClr val="bg1"/>
-            </a:solidFill>
-          </a:ln>
-        </p:spPr>
-        <p:style>
-          <a:lnRef idx="2">
-            <a:schemeClr val="accent2"/>
-          </a:lnRef>
-          <a:fillRef idx="1">
-            <a:schemeClr val="lt1"/>
-          </a:fillRef>
-          <a:effectRef idx="0">
-            <a:schemeClr val="accent2"/>
-          </a:effectRef>
-          <a:fontRef idx="minor">
-            <a:schemeClr val="dk1"/>
-          </a:fontRef>
-        </p:style>
-        <p:txBody>
-          <a:bodyPr rot="0" spcFirstLastPara="0" vertOverflow="overflow" horzOverflow="overflow" vert="horz" wrap="square" lIns="91440" tIns="45720" rIns="91440" bIns="45720" numCol="1" spcCol="0" rtlCol="0" fromWordArt="0" anchor="ctr" anchorCtr="0" forceAA="0" compatLnSpc="1">
-            <a:prstTxWarp prst="textNoShape">
-              <a:avLst/>
-            </a:prstTxWarp>
-            <a:noAutofit/>
-          </a:bodyPr>
-          <a:lstStyle/>
-          <a:p>
-            <a:pPr algn="ctr"/>
-            <a:endParaRPr lang="en-CA"/>
-          </a:p>
-        </p:txBody>
-      </p:sp>
-      <p:sp>
-        <p:nvSpPr>
-          <p:cNvPr id="99" name="Rectangle 98"/>
-          <p:cNvSpPr/>
-          <p:nvPr/>
-        </p:nvSpPr>
-        <p:spPr>
-          <a:xfrm>
-            <a:off x="2455406" y="4605315"/>
-            <a:ext cx="537006" cy="123111"/>
-          </a:xfrm>
-          <a:prstGeom prst="rect">
-            <a:avLst/>
-          </a:prstGeom>
-        </p:spPr>
-        <p:txBody>
-          <a:bodyPr wrap="none" lIns="0" tIns="0" rIns="0" bIns="0">
-            <a:spAutoFit/>
-          </a:bodyPr>
-          <a:lstStyle/>
-          <a:p>
-            <a:r>
-              <a:rPr lang="en-CA" sz="800" dirty="0" err="1" smtClean="0">
-                <a:solidFill>
-                  <a:schemeClr val="bg1"/>
-                </a:solidFill>
-              </a:rPr>
-              <a:t>Anowtalik</a:t>
-            </a:r>
-            <a:r>
-              <a:rPr lang="en-CA" sz="800" dirty="0" smtClean="0">
-                <a:solidFill>
-                  <a:schemeClr val="bg1"/>
-                </a:solidFill>
-              </a:rPr>
-              <a:t>, L.</a:t>
-            </a:r>
-            <a:endParaRPr lang="en-CA" sz="800" dirty="0">
-              <a:solidFill>
-                <a:schemeClr val="bg1"/>
-              </a:solidFill>
-            </a:endParaRPr>
-          </a:p>
-        </p:txBody>
-      </p:sp>
-      <p:sp>
-        <p:nvSpPr>
-          <p:cNvPr id="100" name="Rounded Rectangle 99"/>
-          <p:cNvSpPr/>
-          <p:nvPr/>
-        </p:nvSpPr>
-        <p:spPr>
-          <a:xfrm>
-            <a:off x="2420568" y="4757714"/>
-            <a:ext cx="353491" cy="123112"/>
-          </a:xfrm>
-          <a:prstGeom prst="roundRect">
-            <a:avLst/>
-          </a:prstGeom>
-          <a:solidFill>
-            <a:schemeClr val="tx1">
-              <a:lumMod val="75000"/>
-              <a:lumOff val="25000"/>
-            </a:schemeClr>
-          </a:solidFill>
-          <a:ln w="6350">
-            <a:solidFill>
-              <a:schemeClr val="bg1"/>
-            </a:solidFill>
-          </a:ln>
-        </p:spPr>
-        <p:style>
-          <a:lnRef idx="2">
-            <a:schemeClr val="accent2"/>
-          </a:lnRef>
-          <a:fillRef idx="1">
-            <a:schemeClr val="lt1"/>
-          </a:fillRef>
-          <a:effectRef idx="0">
-            <a:schemeClr val="accent2"/>
-          </a:effectRef>
-          <a:fontRef idx="minor">
-            <a:schemeClr val="dk1"/>
-          </a:fontRef>
-        </p:style>
-        <p:txBody>
-          <a:bodyPr rot="0" spcFirstLastPara="0" vertOverflow="overflow" horzOverflow="overflow" vert="horz" wrap="square" lIns="91440" tIns="45720" rIns="91440" bIns="45720" numCol="1" spcCol="0" rtlCol="0" fromWordArt="0" anchor="ctr" anchorCtr="0" forceAA="0" compatLnSpc="1">
-            <a:prstTxWarp prst="textNoShape">
-              <a:avLst/>
-            </a:prstTxWarp>
-            <a:noAutofit/>
-          </a:bodyPr>
-          <a:lstStyle/>
-          <a:p>
-            <a:pPr algn="ctr"/>
-            <a:endParaRPr lang="en-CA"/>
-          </a:p>
-        </p:txBody>
-      </p:sp>
-      <p:sp>
-        <p:nvSpPr>
-          <p:cNvPr id="101" name="Rectangle 100"/>
-          <p:cNvSpPr/>
-          <p:nvPr/>
-        </p:nvSpPr>
-        <p:spPr>
-          <a:xfrm>
-            <a:off x="2455406" y="4757714"/>
-            <a:ext cx="258084" cy="123111"/>
-          </a:xfrm>
-          <a:prstGeom prst="rect">
-            <a:avLst/>
-          </a:prstGeom>
-        </p:spPr>
-        <p:txBody>
-          <a:bodyPr wrap="none" lIns="0" tIns="0" rIns="0" bIns="0">
-            <a:spAutoFit/>
-          </a:bodyPr>
-          <a:lstStyle/>
-          <a:p>
-            <a:r>
-              <a:rPr lang="en-CA" sz="800" dirty="0" smtClean="0">
-                <a:solidFill>
-                  <a:schemeClr val="bg1"/>
-                </a:solidFill>
-              </a:rPr>
-              <a:t>Antler</a:t>
-            </a:r>
-            <a:endParaRPr lang="en-CA" sz="800" dirty="0">
-              <a:solidFill>
-                <a:schemeClr val="bg1"/>
-              </a:solidFill>
-            </a:endParaRPr>
-          </a:p>
-        </p:txBody>
-      </p:sp>
     </p:spTree>
     <p:extLst>
       <p:ext uri="{BB962C8B-B14F-4D97-AF65-F5344CB8AC3E}">
@@ -20605,13 +20544,13 @@
   <p:clrMapOvr>
     <a:masterClrMapping/>
   </p:clrMapOvr>
-  <mc:AlternateContent xmlns:mc="http://schemas.openxmlformats.org/markup-compatibility/2006">
-    <mc:Choice xmlns:p14="http://schemas.microsoft.com/office/powerpoint/2010/main" Requires="p14">
+  <mc:AlternateContent xmlns:mc="http://schemas.openxmlformats.org/markup-compatibility/2006" xmlns:p14="http://schemas.microsoft.com/office/powerpoint/2010/main">
+    <mc:Choice Requires="p14">
       <p:transition spd="med" p14:dur="700">
         <p:fade/>
       </p:transition>
     </mc:Choice>
-    <mc:Fallback>
+    <mc:Fallback xmlns="">
       <p:transition spd="med">
         <p:fade/>
       </p:transition>
@@ -22715,55 +22654,9 @@
               </a:rPr>
               <a:t>Steatite</a:t>
             </a:r>
-            <a:endParaRPr lang="en-CA" sz="800" dirty="0">
-              <a:solidFill>
-                <a:schemeClr val="bg1"/>
-              </a:solidFill>
-            </a:endParaRPr>
-          </a:p>
-        </p:txBody>
-      </p:sp>
-      <p:pic>
-        <p:nvPicPr>
-          <p:cNvPr id="6148" name="Picture 4" descr="http://www.inuit.com/sites/inuit/gallery/pictures/1369090170374.jpg"/>
-          <p:cNvPicPr>
-            <a:picLocks noChangeAspect="1" noChangeArrowheads="1"/>
-          </p:cNvPicPr>
-          <p:nvPr/>
-        </p:nvPicPr>
-        <p:blipFill>
-          <a:blip r:embed="rId8" cstate="print">
-            <a:extLst>
-              <a:ext uri="{28A0092B-C50C-407E-A947-70E740481C1C}">
-                <a14:useLocalDpi xmlns:a14="http://schemas.microsoft.com/office/drawing/2010/main" val="0"/>
-              </a:ext>
-            </a:extLst>
-          </a:blip>
-          <a:srcRect/>
-          <a:stretch>
-            <a:fillRect/>
-          </a:stretch>
-        </p:blipFill>
-        <p:spPr bwMode="auto">
-          <a:xfrm>
-            <a:off x="2477737" y="1756034"/>
-            <a:ext cx="581760" cy="371356"/>
-          </a:xfrm>
-          <a:prstGeom prst="rect">
-            <a:avLst/>
-          </a:prstGeom>
-          <a:noFill/>
-          <a:extLst>
-            <a:ext uri="{909E8E84-426E-40DD-AFC4-6F175D3DCCD1}">
-              <a14:hiddenFill xmlns:a14="http://schemas.microsoft.com/office/drawing/2010/main">
-                <a:solidFill>
-                  <a:srgbClr val="FFFFFF"/>
-                </a:solidFill>
-              </a14:hiddenFill>
-            </a:ext>
-          </a:extLst>
-        </p:spPr>
-      </p:pic>
+          </a:p>
+        </p:txBody>
+      </p:sp>
       <p:sp>
         <p:nvSpPr>
           <p:cNvPr id="75" name="Rounded Rectangle 74"/>
@@ -23050,47 +22943,6 @@
           </a:p>
         </p:txBody>
       </p:sp>
-      <p:pic>
-        <p:nvPicPr>
-          <p:cNvPr id="6150" name="Picture 6" descr="http://www.inuit.com/sites/inuit/gallery/pictures/1361316745573.jpg"/>
-          <p:cNvPicPr>
-            <a:picLocks noChangeAspect="1" noChangeArrowheads="1"/>
-          </p:cNvPicPr>
-          <p:nvPr/>
-        </p:nvPicPr>
-        <p:blipFill>
-          <a:blip r:embed="rId9" cstate="print">
-            <a:extLst>
-              <a:ext uri="{28A0092B-C50C-407E-A947-70E740481C1C}">
-                <a14:useLocalDpi xmlns:a14="http://schemas.microsoft.com/office/drawing/2010/main" val="0"/>
-              </a:ext>
-            </a:extLst>
-          </a:blip>
-          <a:srcRect/>
-          <a:stretch>
-            <a:fillRect/>
-          </a:stretch>
-        </p:blipFill>
-        <p:spPr bwMode="auto">
-          <a:xfrm>
-            <a:off x="290984" y="4062894"/>
-            <a:ext cx="601362" cy="395395"/>
-          </a:xfrm>
-          <a:prstGeom prst="rect">
-            <a:avLst/>
-          </a:prstGeom>
-          <a:noFill/>
-          <a:extLst>
-            <a:ext uri="{909E8E84-426E-40DD-AFC4-6F175D3DCCD1}">
-              <a14:hiddenFill xmlns:a14="http://schemas.microsoft.com/office/drawing/2010/main">
-                <a:solidFill>
-                  <a:srgbClr val="FFFFFF"/>
-                </a:solidFill>
-              </a14:hiddenFill>
-            </a:ext>
-          </a:extLst>
-        </p:spPr>
-      </p:pic>
       <p:sp>
         <p:nvSpPr>
           <p:cNvPr id="81" name="Rounded Rectangle 80"/>
@@ -23534,7 +23386,7 @@
           <p:nvPr/>
         </p:nvPicPr>
         <p:blipFill>
-          <a:blip r:embed="rId10" cstate="print">
+          <a:blip r:embed="rId8" cstate="print">
             <a:extLst>
               <a:ext uri="{28A0092B-C50C-407E-A947-70E740481C1C}">
                 <a14:useLocalDpi xmlns:a14="http://schemas.microsoft.com/office/drawing/2010/main" val="0"/>
@@ -23588,7 +23440,7 @@
           <p:nvPr/>
         </p:nvPicPr>
         <p:blipFill>
-          <a:blip r:embed="rId11" cstate="print">
+          <a:blip r:embed="rId9" cstate="print">
             <a:extLst>
               <a:ext uri="{28A0092B-C50C-407E-A947-70E740481C1C}">
                 <a14:useLocalDpi xmlns:a14="http://schemas.microsoft.com/office/drawing/2010/main" val="0"/>
@@ -23904,6 +23756,278 @@
       <p:pic>
         <p:nvPicPr>
           <p:cNvPr id="6154" name="Picture 10" descr="http://www.inuit.com/sites/inuit/gallery/pictures/1354314679745.jpg"/>
+          <p:cNvPicPr>
+            <a:picLocks noChangeAspect="1" noChangeArrowheads="1"/>
+          </p:cNvPicPr>
+          <p:nvPr/>
+        </p:nvPicPr>
+        <p:blipFill>
+          <a:blip r:embed="rId10" cstate="print">
+            <a:extLst>
+              <a:ext uri="{28A0092B-C50C-407E-A947-70E740481C1C}">
+                <a14:useLocalDpi xmlns:a14="http://schemas.microsoft.com/office/drawing/2010/main" val="0"/>
+              </a:ext>
+            </a:extLst>
+          </a:blip>
+          <a:srcRect/>
+          <a:stretch>
+            <a:fillRect/>
+          </a:stretch>
+        </p:blipFill>
+        <p:spPr bwMode="auto">
+          <a:xfrm>
+            <a:off x="2610990" y="4031093"/>
+            <a:ext cx="306000" cy="459000"/>
+          </a:xfrm>
+          <a:prstGeom prst="rect">
+            <a:avLst/>
+          </a:prstGeom>
+          <a:noFill/>
+          <a:extLst>
+            <a:ext uri="{909E8E84-426E-40DD-AFC4-6F175D3DCCD1}">
+              <a14:hiddenFill xmlns:a14="http://schemas.microsoft.com/office/drawing/2010/main">
+                <a:solidFill>
+                  <a:srgbClr val="FFFFFF"/>
+                </a:solidFill>
+              </a14:hiddenFill>
+            </a:ext>
+          </a:extLst>
+        </p:spPr>
+      </p:pic>
+      <p:sp>
+        <p:nvSpPr>
+          <p:cNvPr id="98" name="Rounded Rectangle 97"/>
+          <p:cNvSpPr/>
+          <p:nvPr/>
+        </p:nvSpPr>
+        <p:spPr>
+          <a:xfrm>
+            <a:off x="2420568" y="4605314"/>
+            <a:ext cx="675629" cy="123112"/>
+          </a:xfrm>
+          <a:prstGeom prst="roundRect">
+            <a:avLst/>
+          </a:prstGeom>
+          <a:solidFill>
+            <a:schemeClr val="tx1">
+              <a:lumMod val="75000"/>
+              <a:lumOff val="25000"/>
+            </a:schemeClr>
+          </a:solidFill>
+          <a:ln w="6350">
+            <a:solidFill>
+              <a:schemeClr val="bg1"/>
+            </a:solidFill>
+          </a:ln>
+        </p:spPr>
+        <p:style>
+          <a:lnRef idx="2">
+            <a:schemeClr val="accent2"/>
+          </a:lnRef>
+          <a:fillRef idx="1">
+            <a:schemeClr val="lt1"/>
+          </a:fillRef>
+          <a:effectRef idx="0">
+            <a:schemeClr val="accent2"/>
+          </a:effectRef>
+          <a:fontRef idx="minor">
+            <a:schemeClr val="dk1"/>
+          </a:fontRef>
+        </p:style>
+        <p:txBody>
+          <a:bodyPr rot="0" spcFirstLastPara="0" vertOverflow="overflow" horzOverflow="overflow" vert="horz" wrap="square" lIns="91440" tIns="45720" rIns="91440" bIns="45720" numCol="1" spcCol="0" rtlCol="0" fromWordArt="0" anchor="ctr" anchorCtr="0" forceAA="0" compatLnSpc="1">
+            <a:prstTxWarp prst="textNoShape">
+              <a:avLst/>
+            </a:prstTxWarp>
+            <a:noAutofit/>
+          </a:bodyPr>
+          <a:lstStyle/>
+          <a:p>
+            <a:pPr algn="ctr"/>
+            <a:endParaRPr lang="en-CA"/>
+          </a:p>
+        </p:txBody>
+      </p:sp>
+      <p:sp>
+        <p:nvSpPr>
+          <p:cNvPr id="99" name="Rectangle 98"/>
+          <p:cNvSpPr/>
+          <p:nvPr/>
+        </p:nvSpPr>
+        <p:spPr>
+          <a:xfrm>
+            <a:off x="2455406" y="4605315"/>
+            <a:ext cx="537006" cy="123111"/>
+          </a:xfrm>
+          <a:prstGeom prst="rect">
+            <a:avLst/>
+          </a:prstGeom>
+        </p:spPr>
+        <p:txBody>
+          <a:bodyPr wrap="none" lIns="0" tIns="0" rIns="0" bIns="0">
+            <a:spAutoFit/>
+          </a:bodyPr>
+          <a:lstStyle/>
+          <a:p>
+            <a:r>
+              <a:rPr lang="en-CA" sz="800" dirty="0" err="1" smtClean="0">
+                <a:solidFill>
+                  <a:schemeClr val="bg1"/>
+                </a:solidFill>
+              </a:rPr>
+              <a:t>Anowtalik</a:t>
+            </a:r>
+            <a:r>
+              <a:rPr lang="en-CA" sz="800" dirty="0" smtClean="0">
+                <a:solidFill>
+                  <a:schemeClr val="bg1"/>
+                </a:solidFill>
+              </a:rPr>
+              <a:t>, L.</a:t>
+            </a:r>
+            <a:endParaRPr lang="en-CA" sz="800" dirty="0">
+              <a:solidFill>
+                <a:schemeClr val="bg1"/>
+              </a:solidFill>
+            </a:endParaRPr>
+          </a:p>
+        </p:txBody>
+      </p:sp>
+      <p:sp>
+        <p:nvSpPr>
+          <p:cNvPr id="100" name="Rounded Rectangle 99"/>
+          <p:cNvSpPr/>
+          <p:nvPr/>
+        </p:nvSpPr>
+        <p:spPr>
+          <a:xfrm>
+            <a:off x="2420568" y="4757714"/>
+            <a:ext cx="353491" cy="123112"/>
+          </a:xfrm>
+          <a:prstGeom prst="roundRect">
+            <a:avLst/>
+          </a:prstGeom>
+          <a:solidFill>
+            <a:schemeClr val="tx1">
+              <a:lumMod val="75000"/>
+              <a:lumOff val="25000"/>
+            </a:schemeClr>
+          </a:solidFill>
+          <a:ln w="6350">
+            <a:solidFill>
+              <a:schemeClr val="bg1"/>
+            </a:solidFill>
+          </a:ln>
+        </p:spPr>
+        <p:style>
+          <a:lnRef idx="2">
+            <a:schemeClr val="accent2"/>
+          </a:lnRef>
+          <a:fillRef idx="1">
+            <a:schemeClr val="lt1"/>
+          </a:fillRef>
+          <a:effectRef idx="0">
+            <a:schemeClr val="accent2"/>
+          </a:effectRef>
+          <a:fontRef idx="minor">
+            <a:schemeClr val="dk1"/>
+          </a:fontRef>
+        </p:style>
+        <p:txBody>
+          <a:bodyPr rot="0" spcFirstLastPara="0" vertOverflow="overflow" horzOverflow="overflow" vert="horz" wrap="square" lIns="91440" tIns="45720" rIns="91440" bIns="45720" numCol="1" spcCol="0" rtlCol="0" fromWordArt="0" anchor="ctr" anchorCtr="0" forceAA="0" compatLnSpc="1">
+            <a:prstTxWarp prst="textNoShape">
+              <a:avLst/>
+            </a:prstTxWarp>
+            <a:noAutofit/>
+          </a:bodyPr>
+          <a:lstStyle/>
+          <a:p>
+            <a:pPr algn="ctr"/>
+            <a:endParaRPr lang="en-CA"/>
+          </a:p>
+        </p:txBody>
+      </p:sp>
+      <p:sp>
+        <p:nvSpPr>
+          <p:cNvPr id="101" name="Rectangle 100"/>
+          <p:cNvSpPr/>
+          <p:nvPr/>
+        </p:nvSpPr>
+        <p:spPr>
+          <a:xfrm>
+            <a:off x="2455406" y="4757714"/>
+            <a:ext cx="258084" cy="123111"/>
+          </a:xfrm>
+          <a:prstGeom prst="rect">
+            <a:avLst/>
+          </a:prstGeom>
+        </p:spPr>
+        <p:txBody>
+          <a:bodyPr wrap="none" lIns="0" tIns="0" rIns="0" bIns="0">
+            <a:spAutoFit/>
+          </a:bodyPr>
+          <a:lstStyle/>
+          <a:p>
+            <a:r>
+              <a:rPr lang="en-CA" sz="800" dirty="0" smtClean="0">
+                <a:solidFill>
+                  <a:schemeClr val="bg1"/>
+                </a:solidFill>
+              </a:rPr>
+              <a:t>Antler</a:t>
+            </a:r>
+            <a:endParaRPr lang="en-CA" sz="800" dirty="0">
+              <a:solidFill>
+                <a:schemeClr val="bg1"/>
+              </a:solidFill>
+            </a:endParaRPr>
+          </a:p>
+        </p:txBody>
+      </p:sp>
+      <p:pic>
+        <p:nvPicPr>
+          <p:cNvPr id="102" name="Picture 6" descr="http://www.inuit.com/sites/inuit/gallery/pictures/1361316745573.jpg"/>
+          <p:cNvPicPr>
+            <a:picLocks noChangeAspect="1" noChangeArrowheads="1"/>
+          </p:cNvPicPr>
+          <p:nvPr/>
+        </p:nvPicPr>
+        <p:blipFill>
+          <a:blip r:embed="rId11" cstate="print">
+            <a:extLst>
+              <a:ext uri="{28A0092B-C50C-407E-A947-70E740481C1C}">
+                <a14:useLocalDpi xmlns:a14="http://schemas.microsoft.com/office/drawing/2010/main" val="0"/>
+              </a:ext>
+            </a:extLst>
+          </a:blip>
+          <a:srcRect/>
+          <a:stretch>
+            <a:fillRect/>
+          </a:stretch>
+        </p:blipFill>
+        <p:spPr bwMode="auto">
+          <a:xfrm>
+            <a:off x="2456903" y="1744014"/>
+            <a:ext cx="601362" cy="395395"/>
+          </a:xfrm>
+          <a:prstGeom prst="rect">
+            <a:avLst/>
+          </a:prstGeom>
+          <a:noFill/>
+          <a:extLst>
+            <a:ext uri="{909E8E84-426E-40DD-AFC4-6F175D3DCCD1}">
+              <a14:hiddenFill xmlns:a14="http://schemas.microsoft.com/office/drawing/2010/main">
+                <a:solidFill>
+                  <a:srgbClr val="FFFFFF"/>
+                </a:solidFill>
+              </a14:hiddenFill>
+            </a:ext>
+          </a:extLst>
+        </p:spPr>
+      </p:pic>
+      <p:pic>
+        <p:nvPicPr>
+          <p:cNvPr id="104" name="Picture 4" descr="http://www.inuit.com/sites/inuit/gallery/pictures/1369090170374.jpg"/>
           <p:cNvPicPr>
             <a:picLocks noChangeAspect="1" noChangeArrowheads="1"/>
           </p:cNvPicPr>
@@ -23924,8 +24048,8 @@
         </p:blipFill>
         <p:spPr bwMode="auto">
           <a:xfrm>
-            <a:off x="2610990" y="4031093"/>
-            <a:ext cx="306000" cy="459000"/>
+            <a:off x="298516" y="4031744"/>
+            <a:ext cx="581760" cy="371356"/>
           </a:xfrm>
           <a:prstGeom prst="rect">
             <a:avLst/>
@@ -23942,196 +24066,6 @@
           </a:extLst>
         </p:spPr>
       </p:pic>
-      <p:sp>
-        <p:nvSpPr>
-          <p:cNvPr id="98" name="Rounded Rectangle 97"/>
-          <p:cNvSpPr/>
-          <p:nvPr/>
-        </p:nvSpPr>
-        <p:spPr>
-          <a:xfrm>
-            <a:off x="2420568" y="4605314"/>
-            <a:ext cx="675629" cy="123112"/>
-          </a:xfrm>
-          <a:prstGeom prst="roundRect">
-            <a:avLst/>
-          </a:prstGeom>
-          <a:solidFill>
-            <a:schemeClr val="tx1">
-              <a:lumMod val="75000"/>
-              <a:lumOff val="25000"/>
-            </a:schemeClr>
-          </a:solidFill>
-          <a:ln w="6350">
-            <a:solidFill>
-              <a:schemeClr val="bg1"/>
-            </a:solidFill>
-          </a:ln>
-        </p:spPr>
-        <p:style>
-          <a:lnRef idx="2">
-            <a:schemeClr val="accent2"/>
-          </a:lnRef>
-          <a:fillRef idx="1">
-            <a:schemeClr val="lt1"/>
-          </a:fillRef>
-          <a:effectRef idx="0">
-            <a:schemeClr val="accent2"/>
-          </a:effectRef>
-          <a:fontRef idx="minor">
-            <a:schemeClr val="dk1"/>
-          </a:fontRef>
-        </p:style>
-        <p:txBody>
-          <a:bodyPr rot="0" spcFirstLastPara="0" vertOverflow="overflow" horzOverflow="overflow" vert="horz" wrap="square" lIns="91440" tIns="45720" rIns="91440" bIns="45720" numCol="1" spcCol="0" rtlCol="0" fromWordArt="0" anchor="ctr" anchorCtr="0" forceAA="0" compatLnSpc="1">
-            <a:prstTxWarp prst="textNoShape">
-              <a:avLst/>
-            </a:prstTxWarp>
-            <a:noAutofit/>
-          </a:bodyPr>
-          <a:lstStyle/>
-          <a:p>
-            <a:pPr algn="ctr"/>
-            <a:endParaRPr lang="en-CA"/>
-          </a:p>
-        </p:txBody>
-      </p:sp>
-      <p:sp>
-        <p:nvSpPr>
-          <p:cNvPr id="99" name="Rectangle 98"/>
-          <p:cNvSpPr/>
-          <p:nvPr/>
-        </p:nvSpPr>
-        <p:spPr>
-          <a:xfrm>
-            <a:off x="2455406" y="4605315"/>
-            <a:ext cx="537006" cy="123111"/>
-          </a:xfrm>
-          <a:prstGeom prst="rect">
-            <a:avLst/>
-          </a:prstGeom>
-        </p:spPr>
-        <p:txBody>
-          <a:bodyPr wrap="none" lIns="0" tIns="0" rIns="0" bIns="0">
-            <a:spAutoFit/>
-          </a:bodyPr>
-          <a:lstStyle/>
-          <a:p>
-            <a:r>
-              <a:rPr lang="en-CA" sz="800" dirty="0" err="1" smtClean="0">
-                <a:solidFill>
-                  <a:schemeClr val="bg1"/>
-                </a:solidFill>
-              </a:rPr>
-              <a:t>Anowtalik</a:t>
-            </a:r>
-            <a:r>
-              <a:rPr lang="en-CA" sz="800" dirty="0" smtClean="0">
-                <a:solidFill>
-                  <a:schemeClr val="bg1"/>
-                </a:solidFill>
-              </a:rPr>
-              <a:t>, L.</a:t>
-            </a:r>
-            <a:endParaRPr lang="en-CA" sz="800" dirty="0">
-              <a:solidFill>
-                <a:schemeClr val="bg1"/>
-              </a:solidFill>
-            </a:endParaRPr>
-          </a:p>
-        </p:txBody>
-      </p:sp>
-      <p:sp>
-        <p:nvSpPr>
-          <p:cNvPr id="100" name="Rounded Rectangle 99"/>
-          <p:cNvSpPr/>
-          <p:nvPr/>
-        </p:nvSpPr>
-        <p:spPr>
-          <a:xfrm>
-            <a:off x="2420568" y="4757714"/>
-            <a:ext cx="353491" cy="123112"/>
-          </a:xfrm>
-          <a:prstGeom prst="roundRect">
-            <a:avLst/>
-          </a:prstGeom>
-          <a:solidFill>
-            <a:schemeClr val="tx1">
-              <a:lumMod val="75000"/>
-              <a:lumOff val="25000"/>
-            </a:schemeClr>
-          </a:solidFill>
-          <a:ln w="6350">
-            <a:solidFill>
-              <a:schemeClr val="bg1"/>
-            </a:solidFill>
-          </a:ln>
-        </p:spPr>
-        <p:style>
-          <a:lnRef idx="2">
-            <a:schemeClr val="accent2"/>
-          </a:lnRef>
-          <a:fillRef idx="1">
-            <a:schemeClr val="lt1"/>
-          </a:fillRef>
-          <a:effectRef idx="0">
-            <a:schemeClr val="accent2"/>
-          </a:effectRef>
-          <a:fontRef idx="minor">
-            <a:schemeClr val="dk1"/>
-          </a:fontRef>
-        </p:style>
-        <p:txBody>
-          <a:bodyPr rot="0" spcFirstLastPara="0" vertOverflow="overflow" horzOverflow="overflow" vert="horz" wrap="square" lIns="91440" tIns="45720" rIns="91440" bIns="45720" numCol="1" spcCol="0" rtlCol="0" fromWordArt="0" anchor="ctr" anchorCtr="0" forceAA="0" compatLnSpc="1">
-            <a:prstTxWarp prst="textNoShape">
-              <a:avLst/>
-            </a:prstTxWarp>
-            <a:noAutofit/>
-          </a:bodyPr>
-          <a:lstStyle/>
-          <a:p>
-            <a:pPr algn="ctr"/>
-            <a:endParaRPr lang="en-CA"/>
-          </a:p>
-        </p:txBody>
-      </p:sp>
-      <p:sp>
-        <p:nvSpPr>
-          <p:cNvPr id="101" name="Rectangle 100"/>
-          <p:cNvSpPr/>
-          <p:nvPr/>
-        </p:nvSpPr>
-        <p:spPr>
-          <a:xfrm>
-            <a:off x="2455406" y="4757714"/>
-            <a:ext cx="258084" cy="123111"/>
-          </a:xfrm>
-          <a:prstGeom prst="rect">
-            <a:avLst/>
-          </a:prstGeom>
-        </p:spPr>
-        <p:txBody>
-          <a:bodyPr wrap="none" lIns="0" tIns="0" rIns="0" bIns="0">
-            <a:spAutoFit/>
-          </a:bodyPr>
-          <a:lstStyle/>
-          <a:p>
-            <a:r>
-              <a:rPr lang="en-CA" sz="800" dirty="0" smtClean="0">
-                <a:solidFill>
-                  <a:schemeClr val="bg1"/>
-                </a:solidFill>
-              </a:rPr>
-              <a:t>Antler</a:t>
-            </a:r>
-            <a:endParaRPr lang="en-CA" sz="800" dirty="0">
-              <a:solidFill>
-                <a:schemeClr val="bg1"/>
-              </a:solidFill>
-            </a:endParaRPr>
-          </a:p>
-        </p:txBody>
-      </p:sp>
     </p:spTree>
     <p:extLst>
       <p:ext uri="{BB962C8B-B14F-4D97-AF65-F5344CB8AC3E}">
@@ -24142,13 +24076,13 @@
   <p:clrMapOvr>
     <a:masterClrMapping/>
   </p:clrMapOvr>
-  <mc:AlternateContent xmlns:mc="http://schemas.openxmlformats.org/markup-compatibility/2006">
-    <mc:Choice xmlns:p14="http://schemas.microsoft.com/office/powerpoint/2010/main" Requires="p14">
+  <mc:AlternateContent xmlns:mc="http://schemas.openxmlformats.org/markup-compatibility/2006" xmlns:p14="http://schemas.microsoft.com/office/powerpoint/2010/main">
+    <mc:Choice Requires="p14">
       <p:transition spd="med" p14:dur="700">
         <p:fade/>
       </p:transition>
     </mc:Choice>
-    <mc:Fallback>
+    <mc:Fallback xmlns="">
       <p:transition spd="med">
         <p:fade/>
       </p:transition>
@@ -25098,13 +25032,13 @@
   <p:clrMapOvr>
     <a:masterClrMapping/>
   </p:clrMapOvr>
-  <mc:AlternateContent xmlns:mc="http://schemas.openxmlformats.org/markup-compatibility/2006">
-    <mc:Choice xmlns:p14="http://schemas.microsoft.com/office/powerpoint/2010/main" Requires="p14">
+  <mc:AlternateContent xmlns:mc="http://schemas.openxmlformats.org/markup-compatibility/2006" xmlns:p14="http://schemas.microsoft.com/office/powerpoint/2010/main">
+    <mc:Choice Requires="p14">
       <p:transition spd="med" p14:dur="700">
         <p:fade/>
       </p:transition>
     </mc:Choice>
-    <mc:Fallback>
+    <mc:Fallback xmlns="">
       <p:transition spd="med">
         <p:fade/>
       </p:transition>
@@ -25153,8 +25087,8 @@
         </p:nvSpPr>
         <p:spPr>
           <a:xfrm>
-            <a:off x="5076056" y="-961548"/>
-            <a:ext cx="2448272" cy="7200800"/>
+            <a:off x="2771800" y="-961548"/>
+            <a:ext cx="5040560" cy="7200800"/>
           </a:xfrm>
           <a:prstGeom prst="rect">
             <a:avLst/>
@@ -27524,7 +27458,9 @@
             <a:r>
               <a:rPr lang="en-CA" sz="6000" b="1" dirty="0" smtClean="0">
                 <a:solidFill>
-                  <a:schemeClr val="bg1"/>
+                  <a:schemeClr val="bg1">
+                    <a:lumMod val="50000"/>
+                  </a:schemeClr>
                 </a:solidFill>
               </a:rPr>
               <a:t>Bird Shaman</a:t>
@@ -27582,8 +27518,8 @@
         </p:nvSpPr>
         <p:spPr>
           <a:xfrm>
-            <a:off x="9144000" y="2387084"/>
-            <a:ext cx="8999964" cy="1862048"/>
+            <a:off x="9144000" y="3003798"/>
+            <a:ext cx="4784258" cy="1015663"/>
           </a:xfrm>
           <a:prstGeom prst="rect">
             <a:avLst/>
@@ -27596,7 +27532,7 @@
           <a:lstStyle/>
           <a:p>
             <a:r>
-              <a:rPr lang="en-CA" sz="11500" dirty="0" err="1">
+              <a:rPr lang="en-CA" sz="6000" dirty="0" err="1">
                 <a:solidFill>
                   <a:schemeClr val="tx1">
                     <a:lumMod val="75000"/>
@@ -27607,7 +27543,7 @@
               <a:t>Toonoo</a:t>
             </a:r>
             <a:r>
-              <a:rPr lang="en-CA" sz="11500" dirty="0">
+              <a:rPr lang="en-CA" sz="6000" dirty="0">
                 <a:solidFill>
                   <a:schemeClr val="tx1">
                     <a:lumMod val="75000"/>
@@ -27618,7 +27554,7 @@
               <a:t> </a:t>
             </a:r>
             <a:r>
-              <a:rPr lang="en-CA" sz="11500" dirty="0" err="1">
+              <a:rPr lang="en-CA" sz="6000" dirty="0" err="1">
                 <a:solidFill>
                   <a:schemeClr val="tx1">
                     <a:lumMod val="75000"/>
@@ -27628,7 +27564,7 @@
               </a:rPr>
               <a:t>Sharky</a:t>
             </a:r>
-            <a:endParaRPr lang="en-CA" sz="11500" dirty="0">
+            <a:endParaRPr lang="en-CA" sz="6000" dirty="0">
               <a:solidFill>
                 <a:schemeClr val="tx1">
                   <a:lumMod val="75000"/>
@@ -27967,7 +27903,27 @@
             </a:br>
             <a:r>
               <a:rPr lang="en-CA" sz="1400" b="1" dirty="0" smtClean="0"/>
-              <a:t>Winnipeg Art Gallery</a:t>
+              <a:t>Cape </a:t>
+            </a:r>
+            <a:r>
+              <a:rPr lang="en-CA" sz="1400" b="1" dirty="0" smtClean="0"/>
+              <a:t>Dorset, </a:t>
+            </a:r>
+            <a:r>
+              <a:rPr lang="en-CA" sz="1400" b="1" dirty="0" smtClean="0">
+                <a:latin typeface="nunacom" panose="00000400000000000000" pitchFamily="2" charset="0"/>
+              </a:rPr>
+              <a:t>Cape </a:t>
+            </a:r>
+            <a:r>
+              <a:rPr lang="en-CA" sz="1400" b="1" dirty="0">
+                <a:latin typeface="nunacom" panose="00000400000000000000" pitchFamily="2" charset="0"/>
+              </a:rPr>
+              <a:t>Dorset</a:t>
+            </a:r>
+            <a:r>
+              <a:rPr lang="en-CA" sz="1400" b="1" dirty="0" smtClean="0"/>
+              <a:t/>
             </a:r>
             <a:br>
               <a:rPr lang="en-CA" sz="1400" b="1" dirty="0" smtClean="0"/>
@@ -27995,8 +27951,8 @@
         </p:nvSpPr>
         <p:spPr>
           <a:xfrm>
-            <a:off x="7452320" y="627534"/>
-            <a:ext cx="1098570" cy="215444"/>
+            <a:off x="6826828" y="627534"/>
+            <a:ext cx="1724062" cy="215444"/>
           </a:xfrm>
           <a:prstGeom prst="rect">
             <a:avLst/>
@@ -28008,6 +27964,7 @@
           </a:bodyPr>
           <a:lstStyle/>
           <a:p>
+            <a:pPr algn="r"/>
             <a:r>
               <a:rPr lang="en-CA" sz="1400" b="1" dirty="0" err="1" smtClean="0"/>
               <a:t>Toonoo</a:t>
@@ -28019,6 +27976,10 @@
             <a:r>
               <a:rPr lang="en-CA" sz="1400" b="1" dirty="0" err="1" smtClean="0"/>
               <a:t>Sharky</a:t>
+            </a:r>
+            <a:r>
+              <a:rPr lang="en-CA" sz="1400" b="1" dirty="0" smtClean="0"/>
+              <a:t>, b. 1970</a:t>
             </a:r>
             <a:endParaRPr lang="en-CA" sz="1400" b="1" dirty="0" smtClean="0"/>
           </a:p>
@@ -30716,7 +30677,6 @@
                 <a:rPr lang="en-CA" sz="690" b="1" dirty="0"/>
                 <a:t>Shamanism among Eskimo peoples refers to those aspects of the Eskimo cultures that are related to the shamans’ role as a mediator between people and spirits, souls, and mythological beings. Such beliefs and practices were once widespread among Eskimo groups, but today are rarely practiced.</a:t>
               </a:r>
-              <a:endParaRPr lang="en-CA" sz="690" b="1" dirty="0"/>
             </a:p>
           </p:txBody>
         </p:sp>
@@ -31914,7 +31874,6 @@
                 <a:rPr lang="en-CA" sz="690" b="1" dirty="0"/>
                 <a:t>Shamanism among Eskimo peoples refers to those aspects of the Eskimo cultures that are related to the shamans’ role as a mediator between people and spirits, souls, and mythological beings. Such beliefs and practices were once widespread among Eskimo groups, but today are rarely practiced.</a:t>
               </a:r>
-              <a:endParaRPr lang="en-CA" sz="690" b="1" dirty="0"/>
             </a:p>
           </p:txBody>
         </p:sp>
@@ -32010,7 +31969,6 @@
                 <a:rPr lang="en-CA" sz="690" b="1" dirty="0"/>
                 <a:t>Shamanism among Eskimo peoples refers to those aspects of the Eskimo cultures that are related to the shamans’ role as a mediator between people and spirits, souls, and mythological beings. Such beliefs and practices were once widespread among Eskimo groups, but today are rarely practiced.</a:t>
               </a:r>
-              <a:endParaRPr lang="en-CA" sz="690" b="1" dirty="0"/>
             </a:p>
           </p:txBody>
         </p:sp>
@@ -32066,13 +32024,13 @@
   <p:clrMapOvr>
     <a:masterClrMapping/>
   </p:clrMapOvr>
-  <mc:AlternateContent xmlns:mc="http://schemas.openxmlformats.org/markup-compatibility/2006">
-    <mc:Choice xmlns:p14="http://schemas.microsoft.com/office/powerpoint/2010/main" Requires="p14">
+  <mc:AlternateContent xmlns:mc="http://schemas.openxmlformats.org/markup-compatibility/2006" xmlns:p14="http://schemas.microsoft.com/office/powerpoint/2010/main">
+    <mc:Choice Requires="p14">
       <p:transition spd="med" p14:dur="700">
         <p:fade/>
       </p:transition>
     </mc:Choice>
-    <mc:Fallback>
+    <mc:Fallback xmlns="">
       <p:transition spd="med">
         <p:fade/>
       </p:transition>
@@ -33114,7 +33072,6 @@
                 <a:rPr lang="en-CA" sz="690" b="1" dirty="0"/>
                 <a:t>Shamanism among Eskimo peoples refers to those aspects of the Eskimo cultures that are related to the shamans’ role as a mediator between people and spirits, souls, and mythological beings. Such beliefs and practices were once widespread among Eskimo groups, but today are rarely practiced.</a:t>
               </a:r>
-              <a:endParaRPr lang="en-CA" sz="690" b="1" dirty="0"/>
             </a:p>
           </p:txBody>
         </p:sp>
@@ -33210,7 +33167,6 @@
                 <a:rPr lang="en-CA" sz="690" b="1" dirty="0"/>
                 <a:t>Shamanism among Eskimo peoples refers to those aspects of the Eskimo cultures that are related to the shamans’ role as a mediator between people and spirits, souls, and mythological beings. Such beliefs and practices were once widespread among Eskimo groups, but today are rarely practiced.</a:t>
               </a:r>
-              <a:endParaRPr lang="en-CA" sz="690" b="1" dirty="0"/>
             </a:p>
           </p:txBody>
         </p:sp>

</xml_diff>